<commit_message>
Add presentation slides revision
</commit_message>
<xml_diff>
--- a/presentation/presentation.pptx
+++ b/presentation/presentation.pptx
@@ -17,16 +17,19 @@
     <p:sldId id="262" r:id="rId12"/>
     <p:sldId id="263" r:id="rId13"/>
     <p:sldId id="264" r:id="rId14"/>
+    <p:sldId id="265" r:id="rId15"/>
+    <p:sldId id="266" r:id="rId16"/>
+    <p:sldId id="267" r:id="rId17"/>
   </p:sldIdLst>
   <p:sldSz cy="6858000" cx="9144000"/>
   <p:notesSz cx="6858000" cy="9144000"/>
   <p:embeddedFontLst>
     <p:embeddedFont>
       <p:font typeface="Ubuntu"/>
-      <p:regular r:id="rId15"/>
-      <p:bold r:id="rId16"/>
-      <p:italic r:id="rId17"/>
-      <p:boldItalic r:id="rId18"/>
+      <p:regular r:id="rId18"/>
+      <p:bold r:id="rId19"/>
+      <p:italic r:id="rId20"/>
+      <p:boldItalic r:id="rId21"/>
     </p:embeddedFont>
   </p:embeddedFontLst>
   <p:defaultTextStyle>
@@ -274,7 +277,7 @@
       </p15:sldGuideLst>
     </p:ext>
     <p:ext uri="http://customooxmlschemas.google.com/">
-      <go:slidesCustomData xmlns:go="http://customooxmlschemas.google.com/" r:id="rId19" roundtripDataSignature="AMtx7mgLItY7J+MikPE4oxXBSTmnZ8Byhw=="/>
+      <go:slidesCustomData xmlns:go="http://customooxmlschemas.google.com/" r:id="rId22" roundtripDataSignature="AMtx7mikmQtxCsqMUm7mHDn0zlCJLpSV0Q=="/>
     </p:ext>
   </p:extLst>
 </p:presentation>
@@ -805,6 +808,303 @@
 </p:notes>
 </file>
 
+<file path=ppt/notesSlides/notesSlide10.xml><?xml version="1.0" encoding="utf-8"?>
+<p:notes xmlns:a="http://schemas.openxmlformats.org/drawingml/2006/main" xmlns:r="http://schemas.openxmlformats.org/officeDocument/2006/relationships" xmlns:mc="http://schemas.openxmlformats.org/markup-compatibility/2006" xmlns:mv="urn:schemas-microsoft-com:mac:vml" xmlns:p="http://schemas.openxmlformats.org/presentationml/2006/main" xmlns:c="http://schemas.openxmlformats.org/drawingml/2006/chart" xmlns:dgm="http://schemas.openxmlformats.org/drawingml/2006/diagram" xmlns:o="urn:schemas-microsoft-com:office:office" xmlns:v="urn:schemas-microsoft-com:vml" xmlns:pvml="urn:schemas-microsoft-com:office:powerpoint" xmlns:com="http://schemas.openxmlformats.org/drawingml/2006/compatibility" xmlns:p14="http://schemas.microsoft.com/office/powerpoint/2010/main" xmlns:p15="http://schemas.microsoft.com/office/powerpoint/2012/main" showMasterPhAnim="0" showMasterSp="0">
+  <p:cSld>
+    <p:spTree>
+      <p:nvGrpSpPr>
+        <p:cNvPr id="148" name="Shape 148"/>
+        <p:cNvGrpSpPr/>
+        <p:nvPr/>
+      </p:nvGrpSpPr>
+      <p:grpSpPr>
+        <a:xfrm>
+          <a:off x="0" y="0"/>
+          <a:ext cx="0" cy="0"/>
+          <a:chOff x="0" y="0"/>
+          <a:chExt cx="0" cy="0"/>
+        </a:xfrm>
+      </p:grpSpPr>
+      <p:sp>
+        <p:nvSpPr>
+          <p:cNvPr id="149" name="Google Shape;149;g866f9fc50c_0_185:notes"/>
+          <p:cNvSpPr/>
+          <p:nvPr>
+            <p:ph idx="2" type="sldImg"/>
+          </p:nvPr>
+        </p:nvSpPr>
+        <p:spPr>
+          <a:xfrm>
+            <a:off x="1143225" y="685800"/>
+            <a:ext cx="4572300" cy="3429000"/>
+          </a:xfrm>
+          <a:custGeom>
+            <a:rect b="b" l="l" r="r" t="t"/>
+            <a:pathLst>
+              <a:path extrusionOk="0" h="120000" w="120000">
+                <a:moveTo>
+                  <a:pt x="0" y="0"/>
+                </a:moveTo>
+                <a:lnTo>
+                  <a:pt x="120000" y="0"/>
+                </a:lnTo>
+                <a:lnTo>
+                  <a:pt x="120000" y="120000"/>
+                </a:lnTo>
+                <a:lnTo>
+                  <a:pt x="0" y="120000"/>
+                </a:lnTo>
+                <a:close/>
+              </a:path>
+            </a:pathLst>
+          </a:custGeom>
+        </p:spPr>
+      </p:sp>
+      <p:sp>
+        <p:nvSpPr>
+          <p:cNvPr id="150" name="Google Shape;150;g866f9fc50c_0_185:notes"/>
+          <p:cNvSpPr txBox="1"/>
+          <p:nvPr>
+            <p:ph idx="1" type="body"/>
+          </p:nvPr>
+        </p:nvSpPr>
+        <p:spPr>
+          <a:xfrm>
+            <a:off x="685800" y="4343400"/>
+            <a:ext cx="5486400" cy="4114800"/>
+          </a:xfrm>
+          <a:prstGeom prst="rect">
+            <a:avLst/>
+          </a:prstGeom>
+        </p:spPr>
+        <p:txBody>
+          <a:bodyPr anchorCtr="0" anchor="t" bIns="91425" lIns="91425" spcFirstLastPara="1" rIns="91425" wrap="square" tIns="91425">
+            <a:noAutofit/>
+          </a:bodyPr>
+          <a:lstStyle/>
+          <a:p>
+            <a:pPr indent="0" lvl="0" marL="0" rtl="0" algn="l">
+              <a:spcBef>
+                <a:spcPts val="0"/>
+              </a:spcBef>
+              <a:spcAft>
+                <a:spcPts val="0"/>
+              </a:spcAft>
+              <a:buNone/>
+            </a:pPr>
+            <a:r>
+              <a:t/>
+            </a:r>
+            <a:endParaRPr/>
+          </a:p>
+        </p:txBody>
+      </p:sp>
+    </p:spTree>
+  </p:cSld>
+  <p:clrMapOvr>
+    <a:masterClrMapping/>
+  </p:clrMapOvr>
+</p:notes>
+</file>
+
+<file path=ppt/notesSlides/notesSlide11.xml><?xml version="1.0" encoding="utf-8"?>
+<p:notes xmlns:a="http://schemas.openxmlformats.org/drawingml/2006/main" xmlns:r="http://schemas.openxmlformats.org/officeDocument/2006/relationships" xmlns:mc="http://schemas.openxmlformats.org/markup-compatibility/2006" xmlns:mv="urn:schemas-microsoft-com:mac:vml" xmlns:p="http://schemas.openxmlformats.org/presentationml/2006/main" xmlns:c="http://schemas.openxmlformats.org/drawingml/2006/chart" xmlns:dgm="http://schemas.openxmlformats.org/drawingml/2006/diagram" xmlns:o="urn:schemas-microsoft-com:office:office" xmlns:v="urn:schemas-microsoft-com:vml" xmlns:pvml="urn:schemas-microsoft-com:office:powerpoint" xmlns:com="http://schemas.openxmlformats.org/drawingml/2006/compatibility" xmlns:p14="http://schemas.microsoft.com/office/powerpoint/2010/main" xmlns:p15="http://schemas.microsoft.com/office/powerpoint/2012/main" showMasterPhAnim="0" showMasterSp="0">
+  <p:cSld>
+    <p:spTree>
+      <p:nvGrpSpPr>
+        <p:cNvPr id="156" name="Shape 156"/>
+        <p:cNvGrpSpPr/>
+        <p:nvPr/>
+      </p:nvGrpSpPr>
+      <p:grpSpPr>
+        <a:xfrm>
+          <a:off x="0" y="0"/>
+          <a:ext cx="0" cy="0"/>
+          <a:chOff x="0" y="0"/>
+          <a:chExt cx="0" cy="0"/>
+        </a:xfrm>
+      </p:grpSpPr>
+      <p:sp>
+        <p:nvSpPr>
+          <p:cNvPr id="157" name="Google Shape;157;g866f9fc50c_0_220:notes"/>
+          <p:cNvSpPr/>
+          <p:nvPr>
+            <p:ph idx="2" type="sldImg"/>
+          </p:nvPr>
+        </p:nvSpPr>
+        <p:spPr>
+          <a:xfrm>
+            <a:off x="1143225" y="685800"/>
+            <a:ext cx="4572300" cy="3429000"/>
+          </a:xfrm>
+          <a:custGeom>
+            <a:rect b="b" l="l" r="r" t="t"/>
+            <a:pathLst>
+              <a:path extrusionOk="0" h="120000" w="120000">
+                <a:moveTo>
+                  <a:pt x="0" y="0"/>
+                </a:moveTo>
+                <a:lnTo>
+                  <a:pt x="120000" y="0"/>
+                </a:lnTo>
+                <a:lnTo>
+                  <a:pt x="120000" y="120000"/>
+                </a:lnTo>
+                <a:lnTo>
+                  <a:pt x="0" y="120000"/>
+                </a:lnTo>
+                <a:close/>
+              </a:path>
+            </a:pathLst>
+          </a:custGeom>
+        </p:spPr>
+      </p:sp>
+      <p:sp>
+        <p:nvSpPr>
+          <p:cNvPr id="158" name="Google Shape;158;g866f9fc50c_0_220:notes"/>
+          <p:cNvSpPr txBox="1"/>
+          <p:nvPr>
+            <p:ph idx="1" type="body"/>
+          </p:nvPr>
+        </p:nvSpPr>
+        <p:spPr>
+          <a:xfrm>
+            <a:off x="685800" y="4343400"/>
+            <a:ext cx="5486400" cy="4114800"/>
+          </a:xfrm>
+          <a:prstGeom prst="rect">
+            <a:avLst/>
+          </a:prstGeom>
+        </p:spPr>
+        <p:txBody>
+          <a:bodyPr anchorCtr="0" anchor="t" bIns="91425" lIns="91425" spcFirstLastPara="1" rIns="91425" wrap="square" tIns="91425">
+            <a:noAutofit/>
+          </a:bodyPr>
+          <a:lstStyle/>
+          <a:p>
+            <a:pPr indent="0" lvl="0" marL="0" rtl="0" algn="l">
+              <a:spcBef>
+                <a:spcPts val="0"/>
+              </a:spcBef>
+              <a:spcAft>
+                <a:spcPts val="0"/>
+              </a:spcAft>
+              <a:buNone/>
+            </a:pPr>
+            <a:r>
+              <a:t/>
+            </a:r>
+            <a:endParaRPr/>
+          </a:p>
+        </p:txBody>
+      </p:sp>
+    </p:spTree>
+  </p:cSld>
+  <p:clrMapOvr>
+    <a:masterClrMapping/>
+  </p:clrMapOvr>
+</p:notes>
+</file>
+
+<file path=ppt/notesSlides/notesSlide12.xml><?xml version="1.0" encoding="utf-8"?>
+<p:notes xmlns:a="http://schemas.openxmlformats.org/drawingml/2006/main" xmlns:r="http://schemas.openxmlformats.org/officeDocument/2006/relationships" xmlns:mc="http://schemas.openxmlformats.org/markup-compatibility/2006" xmlns:mv="urn:schemas-microsoft-com:mac:vml" xmlns:p="http://schemas.openxmlformats.org/presentationml/2006/main" xmlns:c="http://schemas.openxmlformats.org/drawingml/2006/chart" xmlns:dgm="http://schemas.openxmlformats.org/drawingml/2006/diagram" xmlns:o="urn:schemas-microsoft-com:office:office" xmlns:v="urn:schemas-microsoft-com:vml" xmlns:pvml="urn:schemas-microsoft-com:office:powerpoint" xmlns:com="http://schemas.openxmlformats.org/drawingml/2006/compatibility" xmlns:p14="http://schemas.microsoft.com/office/powerpoint/2010/main" xmlns:p15="http://schemas.microsoft.com/office/powerpoint/2012/main" showMasterPhAnim="0" showMasterSp="0">
+  <p:cSld>
+    <p:spTree>
+      <p:nvGrpSpPr>
+        <p:cNvPr id="162" name="Shape 162"/>
+        <p:cNvGrpSpPr/>
+        <p:nvPr/>
+      </p:nvGrpSpPr>
+      <p:grpSpPr>
+        <a:xfrm>
+          <a:off x="0" y="0"/>
+          <a:ext cx="0" cy="0"/>
+          <a:chOff x="0" y="0"/>
+          <a:chExt cx="0" cy="0"/>
+        </a:xfrm>
+      </p:grpSpPr>
+      <p:sp>
+        <p:nvSpPr>
+          <p:cNvPr id="163" name="Google Shape;163;g866f9fc50c_0_225:notes"/>
+          <p:cNvSpPr/>
+          <p:nvPr>
+            <p:ph idx="2" type="sldImg"/>
+          </p:nvPr>
+        </p:nvSpPr>
+        <p:spPr>
+          <a:xfrm>
+            <a:off x="1143225" y="685800"/>
+            <a:ext cx="4572300" cy="3429000"/>
+          </a:xfrm>
+          <a:custGeom>
+            <a:rect b="b" l="l" r="r" t="t"/>
+            <a:pathLst>
+              <a:path extrusionOk="0" h="120000" w="120000">
+                <a:moveTo>
+                  <a:pt x="0" y="0"/>
+                </a:moveTo>
+                <a:lnTo>
+                  <a:pt x="120000" y="0"/>
+                </a:lnTo>
+                <a:lnTo>
+                  <a:pt x="120000" y="120000"/>
+                </a:lnTo>
+                <a:lnTo>
+                  <a:pt x="0" y="120000"/>
+                </a:lnTo>
+                <a:close/>
+              </a:path>
+            </a:pathLst>
+          </a:custGeom>
+        </p:spPr>
+      </p:sp>
+      <p:sp>
+        <p:nvSpPr>
+          <p:cNvPr id="164" name="Google Shape;164;g866f9fc50c_0_225:notes"/>
+          <p:cNvSpPr txBox="1"/>
+          <p:nvPr>
+            <p:ph idx="1" type="body"/>
+          </p:nvPr>
+        </p:nvSpPr>
+        <p:spPr>
+          <a:xfrm>
+            <a:off x="685800" y="4343400"/>
+            <a:ext cx="5486400" cy="4114800"/>
+          </a:xfrm>
+          <a:prstGeom prst="rect">
+            <a:avLst/>
+          </a:prstGeom>
+        </p:spPr>
+        <p:txBody>
+          <a:bodyPr anchorCtr="0" anchor="t" bIns="91425" lIns="91425" spcFirstLastPara="1" rIns="91425" wrap="square" tIns="91425">
+            <a:noAutofit/>
+          </a:bodyPr>
+          <a:lstStyle/>
+          <a:p>
+            <a:pPr indent="0" lvl="0" marL="0" rtl="0" algn="l">
+              <a:spcBef>
+                <a:spcPts val="0"/>
+              </a:spcBef>
+              <a:spcAft>
+                <a:spcPts val="0"/>
+              </a:spcAft>
+              <a:buNone/>
+            </a:pPr>
+            <a:r>
+              <a:t/>
+            </a:r>
+            <a:endParaRPr/>
+          </a:p>
+        </p:txBody>
+      </p:sp>
+    </p:spTree>
+  </p:cSld>
+  <p:clrMapOvr>
+    <a:masterClrMapping/>
+  </p:clrMapOvr>
+</p:notes>
+</file>
+
 <file path=ppt/notesSlides/notesSlide2.xml><?xml version="1.0" encoding="utf-8"?>
 <p:notes xmlns:a="http://schemas.openxmlformats.org/drawingml/2006/main" xmlns:r="http://schemas.openxmlformats.org/officeDocument/2006/relationships" xmlns:mc="http://schemas.openxmlformats.org/markup-compatibility/2006" xmlns:mv="urn:schemas-microsoft-com:mac:vml" xmlns:p="http://schemas.openxmlformats.org/presentationml/2006/main" xmlns:c="http://schemas.openxmlformats.org/drawingml/2006/chart" xmlns:dgm="http://schemas.openxmlformats.org/drawingml/2006/diagram" xmlns:o="urn:schemas-microsoft-com:office:office" xmlns:v="urn:schemas-microsoft-com:vml" xmlns:pvml="urn:schemas-microsoft-com:office:powerpoint" xmlns:com="http://schemas.openxmlformats.org/drawingml/2006/compatibility" xmlns:p14="http://schemas.microsoft.com/office/powerpoint/2010/main" xmlns:p15="http://schemas.microsoft.com/office/powerpoint/2012/main" showMasterPhAnim="0" showMasterSp="0">
   <p:cSld>
@@ -909,7 +1209,7 @@
   <p:cSld>
     <p:spTree>
       <p:nvGrpSpPr>
-        <p:cNvPr id="94" name="Shape 94"/>
+        <p:cNvPr id="95" name="Shape 95"/>
         <p:cNvGrpSpPr/>
         <p:nvPr/>
       </p:nvGrpSpPr>
@@ -923,7 +1223,7 @@
       </p:grpSpPr>
       <p:sp>
         <p:nvSpPr>
-          <p:cNvPr id="95" name="Google Shape;95;g866f9fc50c_0_165:notes"/>
+          <p:cNvPr id="96" name="Google Shape;96;g8c6def6be4_0_10:notes"/>
           <p:cNvSpPr/>
           <p:nvPr>
             <p:ph idx="2" type="sldImg"/>
@@ -958,7 +1258,7 @@
       </p:sp>
       <p:sp>
         <p:nvSpPr>
-          <p:cNvPr id="96" name="Google Shape;96;g866f9fc50c_0_165:notes"/>
+          <p:cNvPr id="97" name="Google Shape;97;g8c6def6be4_0_10:notes"/>
           <p:cNvSpPr txBox="1"/>
           <p:nvPr>
             <p:ph idx="1" type="body"/>
@@ -1008,7 +1308,7 @@
   <p:cSld>
     <p:spTree>
       <p:nvGrpSpPr>
-        <p:cNvPr id="100" name="Shape 100"/>
+        <p:cNvPr id="103" name="Shape 103"/>
         <p:cNvGrpSpPr/>
         <p:nvPr/>
       </p:nvGrpSpPr>
@@ -1022,7 +1322,7 @@
       </p:grpSpPr>
       <p:sp>
         <p:nvSpPr>
-          <p:cNvPr id="101" name="Google Shape;101;g866f9fc50c_0_170:notes"/>
+          <p:cNvPr id="104" name="Google Shape;104;g866f9fc50c_0_165:notes"/>
           <p:cNvSpPr/>
           <p:nvPr>
             <p:ph idx="2" type="sldImg"/>
@@ -1057,7 +1357,7 @@
       </p:sp>
       <p:sp>
         <p:nvSpPr>
-          <p:cNvPr id="102" name="Google Shape;102;g866f9fc50c_0_170:notes"/>
+          <p:cNvPr id="105" name="Google Shape;105;g866f9fc50c_0_165:notes"/>
           <p:cNvSpPr txBox="1"/>
           <p:nvPr>
             <p:ph idx="1" type="body"/>
@@ -1107,7 +1407,7 @@
   <p:cSld>
     <p:spTree>
       <p:nvGrpSpPr>
-        <p:cNvPr id="106" name="Shape 106"/>
+        <p:cNvPr id="110" name="Shape 110"/>
         <p:cNvGrpSpPr/>
         <p:nvPr/>
       </p:nvGrpSpPr>
@@ -1121,7 +1421,7 @@
       </p:grpSpPr>
       <p:sp>
         <p:nvSpPr>
-          <p:cNvPr id="107" name="Google Shape;107;g866f9fc50c_0_175:notes"/>
+          <p:cNvPr id="111" name="Google Shape;111;g8c6def6be4_0_17:notes"/>
           <p:cNvSpPr/>
           <p:nvPr>
             <p:ph idx="2" type="sldImg"/>
@@ -1156,7 +1456,7 @@
       </p:sp>
       <p:sp>
         <p:nvSpPr>
-          <p:cNvPr id="108" name="Google Shape;108;g866f9fc50c_0_175:notes"/>
+          <p:cNvPr id="112" name="Google Shape;112;g8c6def6be4_0_17:notes"/>
           <p:cNvSpPr txBox="1"/>
           <p:nvPr>
             <p:ph idx="1" type="body"/>
@@ -1206,7 +1506,7 @@
   <p:cSld>
     <p:spTree>
       <p:nvGrpSpPr>
-        <p:cNvPr id="112" name="Shape 112"/>
+        <p:cNvPr id="117" name="Shape 117"/>
         <p:cNvGrpSpPr/>
         <p:nvPr/>
       </p:nvGrpSpPr>
@@ -1220,7 +1520,7 @@
       </p:grpSpPr>
       <p:sp>
         <p:nvSpPr>
-          <p:cNvPr id="113" name="Google Shape;113;g866f9fc50c_0_180:notes"/>
+          <p:cNvPr id="118" name="Google Shape;118;g866f9fc50c_0_170:notes"/>
           <p:cNvSpPr/>
           <p:nvPr>
             <p:ph idx="2" type="sldImg"/>
@@ -1255,7 +1555,7 @@
       </p:sp>
       <p:sp>
         <p:nvSpPr>
-          <p:cNvPr id="114" name="Google Shape;114;g866f9fc50c_0_180:notes"/>
+          <p:cNvPr id="119" name="Google Shape;119;g866f9fc50c_0_170:notes"/>
           <p:cNvSpPr txBox="1"/>
           <p:nvPr>
             <p:ph idx="1" type="body"/>
@@ -1305,7 +1605,7 @@
   <p:cSld>
     <p:spTree>
       <p:nvGrpSpPr>
-        <p:cNvPr id="118" name="Shape 118"/>
+        <p:cNvPr id="125" name="Shape 125"/>
         <p:cNvGrpSpPr/>
         <p:nvPr/>
       </p:nvGrpSpPr>
@@ -1319,7 +1619,7 @@
       </p:grpSpPr>
       <p:sp>
         <p:nvSpPr>
-          <p:cNvPr id="119" name="Google Shape;119;g866f9fc50c_0_185:notes"/>
+          <p:cNvPr id="126" name="Google Shape;126;g866f9fc50c_0_175:notes"/>
           <p:cNvSpPr/>
           <p:nvPr>
             <p:ph idx="2" type="sldImg"/>
@@ -1354,7 +1654,7 @@
       </p:sp>
       <p:sp>
         <p:nvSpPr>
-          <p:cNvPr id="120" name="Google Shape;120;g866f9fc50c_0_185:notes"/>
+          <p:cNvPr id="127" name="Google Shape;127;g866f9fc50c_0_175:notes"/>
           <p:cNvSpPr txBox="1"/>
           <p:nvPr>
             <p:ph idx="1" type="body"/>
@@ -1404,7 +1704,7 @@
   <p:cSld>
     <p:spTree>
       <p:nvGrpSpPr>
-        <p:cNvPr id="124" name="Shape 124"/>
+        <p:cNvPr id="133" name="Shape 133"/>
         <p:cNvGrpSpPr/>
         <p:nvPr/>
       </p:nvGrpSpPr>
@@ -1418,7 +1718,7 @@
       </p:grpSpPr>
       <p:sp>
         <p:nvSpPr>
-          <p:cNvPr id="125" name="Google Shape;125;g866f9fc50c_0_220:notes"/>
+          <p:cNvPr id="134" name="Google Shape;134;g8c6def6be4_0_39:notes"/>
           <p:cNvSpPr/>
           <p:nvPr>
             <p:ph idx="2" type="sldImg"/>
@@ -1453,7 +1753,7 @@
       </p:sp>
       <p:sp>
         <p:nvSpPr>
-          <p:cNvPr id="126" name="Google Shape;126;g866f9fc50c_0_220:notes"/>
+          <p:cNvPr id="135" name="Google Shape;135;g8c6def6be4_0_39:notes"/>
           <p:cNvSpPr txBox="1"/>
           <p:nvPr>
             <p:ph idx="1" type="body"/>
@@ -1503,7 +1803,7 @@
   <p:cSld>
     <p:spTree>
       <p:nvGrpSpPr>
-        <p:cNvPr id="130" name="Shape 130"/>
+        <p:cNvPr id="139" name="Shape 139"/>
         <p:cNvGrpSpPr/>
         <p:nvPr/>
       </p:nvGrpSpPr>
@@ -1517,7 +1817,7 @@
       </p:grpSpPr>
       <p:sp>
         <p:nvSpPr>
-          <p:cNvPr id="131" name="Google Shape;131;g866f9fc50c_0_225:notes"/>
+          <p:cNvPr id="140" name="Google Shape;140;g866f9fc50c_0_180:notes"/>
           <p:cNvSpPr/>
           <p:nvPr>
             <p:ph idx="2" type="sldImg"/>
@@ -1552,7 +1852,7 @@
       </p:sp>
       <p:sp>
         <p:nvSpPr>
-          <p:cNvPr id="132" name="Google Shape;132;g866f9fc50c_0_225:notes"/>
+          <p:cNvPr id="141" name="Google Shape;141;g866f9fc50c_0_180:notes"/>
           <p:cNvSpPr txBox="1"/>
           <p:nvPr>
             <p:ph idx="1" type="body"/>
@@ -3514,7 +3814,7 @@
             <a:normAutofit/>
           </a:bodyPr>
           <a:lstStyle>
-            <a:lvl1pPr indent="-342900" lvl="0" marL="457200" algn="l">
+            <a:lvl1pPr indent="-381000" lvl="0" marL="457200" algn="l">
               <a:spcBef>
                 <a:spcPts val="360"/>
               </a:spcBef>
@@ -3524,11 +3824,11 @@
               <a:buClr>
                 <a:schemeClr val="dk1"/>
               </a:buClr>
-              <a:buSzPts val="1800"/>
+              <a:buSzPts val="2400"/>
               <a:buChar char="●"/>
-              <a:defRPr/>
+              <a:defRPr sz="2400"/>
             </a:lvl1pPr>
-            <a:lvl2pPr indent="-342900" lvl="1" marL="914400" algn="l">
+            <a:lvl2pPr indent="-381000" lvl="1" marL="914400" algn="l">
               <a:spcBef>
                 <a:spcPts val="360"/>
               </a:spcBef>
@@ -3538,11 +3838,11 @@
               <a:buClr>
                 <a:schemeClr val="dk1"/>
               </a:buClr>
-              <a:buSzPts val="1800"/>
+              <a:buSzPts val="2400"/>
               <a:buChar char="○"/>
-              <a:defRPr/>
+              <a:defRPr sz="2400"/>
             </a:lvl2pPr>
-            <a:lvl3pPr indent="-342900" lvl="2" marL="1371600" algn="l">
+            <a:lvl3pPr indent="-381000" lvl="2" marL="1371600" algn="l">
               <a:spcBef>
                 <a:spcPts val="360"/>
               </a:spcBef>
@@ -3552,11 +3852,11 @@
               <a:buClr>
                 <a:schemeClr val="dk1"/>
               </a:buClr>
-              <a:buSzPts val="1800"/>
+              <a:buSzPts val="2400"/>
               <a:buChar char="■"/>
-              <a:defRPr/>
+              <a:defRPr sz="2400"/>
             </a:lvl3pPr>
-            <a:lvl4pPr indent="-342900" lvl="3" marL="1828800" algn="l">
+            <a:lvl4pPr indent="-381000" lvl="3" marL="1828800" algn="l">
               <a:spcBef>
                 <a:spcPts val="360"/>
               </a:spcBef>
@@ -3566,11 +3866,11 @@
               <a:buClr>
                 <a:schemeClr val="dk1"/>
               </a:buClr>
-              <a:buSzPts val="1800"/>
+              <a:buSzPts val="2400"/>
               <a:buChar char="●"/>
-              <a:defRPr/>
+              <a:defRPr sz="2400"/>
             </a:lvl4pPr>
-            <a:lvl5pPr indent="-342900" lvl="4" marL="2286000" algn="l">
+            <a:lvl5pPr indent="-381000" lvl="4" marL="2286000" algn="l">
               <a:spcBef>
                 <a:spcPts val="360"/>
               </a:spcBef>
@@ -3580,11 +3880,11 @@
               <a:buClr>
                 <a:schemeClr val="dk1"/>
               </a:buClr>
-              <a:buSzPts val="1800"/>
+              <a:buSzPts val="2400"/>
               <a:buChar char="○"/>
-              <a:defRPr/>
+              <a:defRPr sz="2400"/>
             </a:lvl5pPr>
-            <a:lvl6pPr indent="-342900" lvl="5" marL="2743200" algn="l">
+            <a:lvl6pPr indent="-381000" lvl="5" marL="2743200" algn="l">
               <a:spcBef>
                 <a:spcPts val="360"/>
               </a:spcBef>
@@ -3594,11 +3894,11 @@
               <a:buClr>
                 <a:schemeClr val="dk1"/>
               </a:buClr>
-              <a:buSzPts val="1800"/>
+              <a:buSzPts val="2400"/>
               <a:buChar char="■"/>
-              <a:defRPr/>
+              <a:defRPr sz="2400"/>
             </a:lvl6pPr>
-            <a:lvl7pPr indent="-342900" lvl="6" marL="3200400" algn="l">
+            <a:lvl7pPr indent="-381000" lvl="6" marL="3200400" algn="l">
               <a:spcBef>
                 <a:spcPts val="360"/>
               </a:spcBef>
@@ -3608,11 +3908,11 @@
               <a:buClr>
                 <a:schemeClr val="dk1"/>
               </a:buClr>
-              <a:buSzPts val="1800"/>
+              <a:buSzPts val="2400"/>
               <a:buChar char="●"/>
-              <a:defRPr/>
+              <a:defRPr sz="2400"/>
             </a:lvl7pPr>
-            <a:lvl8pPr indent="-342900" lvl="7" marL="3657600" algn="l">
+            <a:lvl8pPr indent="-381000" lvl="7" marL="3657600" algn="l">
               <a:spcBef>
                 <a:spcPts val="360"/>
               </a:spcBef>
@@ -3622,11 +3922,11 @@
               <a:buClr>
                 <a:schemeClr val="dk1"/>
               </a:buClr>
-              <a:buSzPts val="1800"/>
+              <a:buSzPts val="2400"/>
               <a:buChar char="○"/>
-              <a:defRPr/>
+              <a:defRPr sz="2400"/>
             </a:lvl8pPr>
-            <a:lvl9pPr indent="-342900" lvl="8" marL="4114800" algn="l">
+            <a:lvl9pPr indent="-381000" lvl="8" marL="4114800" algn="l">
               <a:spcBef>
                 <a:spcPts val="360"/>
               </a:spcBef>
@@ -3636,9 +3936,9 @@
               <a:buClr>
                 <a:schemeClr val="dk1"/>
               </a:buClr>
-              <a:buSzPts val="1800"/>
+              <a:buSzPts val="2400"/>
               <a:buChar char="■"/>
-              <a:defRPr/>
+              <a:defRPr sz="2400"/>
             </a:lvl9pPr>
           </a:lstStyle>
           <a:p/>
@@ -10896,6 +11196,431 @@
 </p:sld>
 </file>
 
+<file path=ppt/slides/slide10.xml><?xml version="1.0" encoding="utf-8"?>
+<p:sld xmlns:a="http://schemas.openxmlformats.org/drawingml/2006/main" xmlns:r="http://schemas.openxmlformats.org/officeDocument/2006/relationships" xmlns:mc="http://schemas.openxmlformats.org/markup-compatibility/2006" xmlns:mv="urn:schemas-microsoft-com:mac:vml" xmlns:p="http://schemas.openxmlformats.org/presentationml/2006/main" xmlns:c="http://schemas.openxmlformats.org/drawingml/2006/chart" xmlns:dgm="http://schemas.openxmlformats.org/drawingml/2006/diagram" xmlns:o="urn:schemas-microsoft-com:office:office" xmlns:v="urn:schemas-microsoft-com:vml" xmlns:pvml="urn:schemas-microsoft-com:office:powerpoint" xmlns:com="http://schemas.openxmlformats.org/drawingml/2006/compatibility" xmlns:p14="http://schemas.microsoft.com/office/powerpoint/2010/main" xmlns:p15="http://schemas.microsoft.com/office/powerpoint/2012/main">
+  <p:cSld>
+    <p:spTree>
+      <p:nvGrpSpPr>
+        <p:cNvPr id="151" name="Shape 151"/>
+        <p:cNvGrpSpPr/>
+        <p:nvPr/>
+      </p:nvGrpSpPr>
+      <p:grpSpPr>
+        <a:xfrm>
+          <a:off x="0" y="0"/>
+          <a:ext cx="0" cy="0"/>
+          <a:chOff x="0" y="0"/>
+          <a:chExt cx="0" cy="0"/>
+        </a:xfrm>
+      </p:grpSpPr>
+      <p:sp>
+        <p:nvSpPr>
+          <p:cNvPr id="152" name="Google Shape;152;g866f9fc50c_0_185"/>
+          <p:cNvSpPr txBox="1"/>
+          <p:nvPr>
+            <p:ph type="title"/>
+          </p:nvPr>
+        </p:nvSpPr>
+        <p:spPr>
+          <a:xfrm>
+            <a:off x="245725" y="0"/>
+            <a:ext cx="5055900" cy="1207500"/>
+          </a:xfrm>
+          <a:prstGeom prst="rect">
+            <a:avLst/>
+          </a:prstGeom>
+        </p:spPr>
+        <p:txBody>
+          <a:bodyPr anchorCtr="0" anchor="ctr" bIns="91425" lIns="91425" spcFirstLastPara="1" rIns="91425" wrap="square" tIns="91425">
+            <a:noAutofit/>
+          </a:bodyPr>
+          <a:lstStyle/>
+          <a:p>
+            <a:pPr indent="0" lvl="0" marL="0" rtl="0" algn="l">
+              <a:spcBef>
+                <a:spcPts val="0"/>
+              </a:spcBef>
+              <a:spcAft>
+                <a:spcPts val="0"/>
+              </a:spcAft>
+              <a:buNone/>
+            </a:pPr>
+            <a:r>
+              <a:rPr lang="it-IT"/>
+              <a:t>Risultati Sperimentali</a:t>
+            </a:r>
+            <a:endParaRPr/>
+          </a:p>
+        </p:txBody>
+      </p:sp>
+      <p:pic>
+        <p:nvPicPr>
+          <p:cNvPr id="153" name="Google Shape;153;g866f9fc50c_0_185"/>
+          <p:cNvPicPr preferRelativeResize="0"/>
+          <p:nvPr/>
+        </p:nvPicPr>
+        <p:blipFill>
+          <a:blip r:embed="rId3">
+            <a:alphaModFix/>
+          </a:blip>
+          <a:stretch>
+            <a:fillRect/>
+          </a:stretch>
+        </p:blipFill>
+        <p:spPr>
+          <a:xfrm>
+            <a:off x="457201" y="3429023"/>
+            <a:ext cx="3820176" cy="2546764"/>
+          </a:xfrm>
+          <a:prstGeom prst="rect">
+            <a:avLst/>
+          </a:prstGeom>
+          <a:noFill/>
+          <a:ln>
+            <a:noFill/>
+          </a:ln>
+        </p:spPr>
+      </p:pic>
+      <p:pic>
+        <p:nvPicPr>
+          <p:cNvPr id="154" name="Google Shape;154;g866f9fc50c_0_185"/>
+          <p:cNvPicPr preferRelativeResize="0"/>
+          <p:nvPr/>
+        </p:nvPicPr>
+        <p:blipFill>
+          <a:blip r:embed="rId4">
+            <a:alphaModFix/>
+          </a:blip>
+          <a:stretch>
+            <a:fillRect/>
+          </a:stretch>
+        </p:blipFill>
+        <p:spPr>
+          <a:xfrm>
+            <a:off x="5051949" y="3429000"/>
+            <a:ext cx="3820182" cy="2546800"/>
+          </a:xfrm>
+          <a:prstGeom prst="rect">
+            <a:avLst/>
+          </a:prstGeom>
+          <a:noFill/>
+          <a:ln>
+            <a:noFill/>
+          </a:ln>
+        </p:spPr>
+      </p:pic>
+      <p:pic>
+        <p:nvPicPr>
+          <p:cNvPr id="155" name="Google Shape;155;g866f9fc50c_0_185"/>
+          <p:cNvPicPr preferRelativeResize="0"/>
+          <p:nvPr/>
+        </p:nvPicPr>
+        <p:blipFill rotWithShape="1">
+          <a:blip r:embed="rId5">
+            <a:alphaModFix/>
+          </a:blip>
+          <a:srcRect b="0" l="129" r="129" t="0"/>
+          <a:stretch/>
+        </p:blipFill>
+        <p:spPr>
+          <a:xfrm>
+            <a:off x="1957125" y="1941738"/>
+            <a:ext cx="4752974" cy="1247099"/>
+          </a:xfrm>
+          <a:prstGeom prst="rect">
+            <a:avLst/>
+          </a:prstGeom>
+          <a:noFill/>
+          <a:ln>
+            <a:noFill/>
+          </a:ln>
+        </p:spPr>
+      </p:pic>
+    </p:spTree>
+  </p:cSld>
+  <p:clrMapOvr>
+    <a:masterClrMapping/>
+  </p:clrMapOvr>
+</p:sld>
+</file>
+
+<file path=ppt/slides/slide11.xml><?xml version="1.0" encoding="utf-8"?>
+<p:sld xmlns:a="http://schemas.openxmlformats.org/drawingml/2006/main" xmlns:r="http://schemas.openxmlformats.org/officeDocument/2006/relationships" xmlns:mc="http://schemas.openxmlformats.org/markup-compatibility/2006" xmlns:mv="urn:schemas-microsoft-com:mac:vml" xmlns:p="http://schemas.openxmlformats.org/presentationml/2006/main" xmlns:c="http://schemas.openxmlformats.org/drawingml/2006/chart" xmlns:dgm="http://schemas.openxmlformats.org/drawingml/2006/diagram" xmlns:o="urn:schemas-microsoft-com:office:office" xmlns:v="urn:schemas-microsoft-com:vml" xmlns:pvml="urn:schemas-microsoft-com:office:powerpoint" xmlns:com="http://schemas.openxmlformats.org/drawingml/2006/compatibility" xmlns:p14="http://schemas.microsoft.com/office/powerpoint/2010/main" xmlns:p15="http://schemas.microsoft.com/office/powerpoint/2012/main">
+  <p:cSld>
+    <p:spTree>
+      <p:nvGrpSpPr>
+        <p:cNvPr id="159" name="Shape 159"/>
+        <p:cNvGrpSpPr/>
+        <p:nvPr/>
+      </p:nvGrpSpPr>
+      <p:grpSpPr>
+        <a:xfrm>
+          <a:off x="0" y="0"/>
+          <a:ext cx="0" cy="0"/>
+          <a:chOff x="0" y="0"/>
+          <a:chExt cx="0" cy="0"/>
+        </a:xfrm>
+      </p:grpSpPr>
+      <p:sp>
+        <p:nvSpPr>
+          <p:cNvPr id="160" name="Google Shape;160;g866f9fc50c_0_220"/>
+          <p:cNvSpPr txBox="1"/>
+          <p:nvPr>
+            <p:ph idx="1" type="body"/>
+          </p:nvPr>
+        </p:nvSpPr>
+        <p:spPr>
+          <a:xfrm>
+            <a:off x="457200" y="1600200"/>
+            <a:ext cx="8229600" cy="4526100"/>
+          </a:xfrm>
+          <a:prstGeom prst="rect">
+            <a:avLst/>
+          </a:prstGeom>
+        </p:spPr>
+        <p:txBody>
+          <a:bodyPr anchorCtr="0" anchor="t" bIns="45700" lIns="91425" spcFirstLastPara="1" rIns="91425" wrap="square" tIns="45700">
+            <a:noAutofit/>
+          </a:bodyPr>
+          <a:lstStyle/>
+          <a:p>
+            <a:pPr indent="-381000" lvl="0" marL="457200" rtl="0" algn="l">
+              <a:spcBef>
+                <a:spcPts val="360"/>
+              </a:spcBef>
+              <a:spcAft>
+                <a:spcPts val="0"/>
+              </a:spcAft>
+              <a:buSzPts val="2400"/>
+              <a:buChar char="●"/>
+            </a:pPr>
+            <a:r>
+              <a:rPr lang="it-IT"/>
+              <a:t>Il modello di machine learning esposto ha permesso di progettare un sistema di localizzazione indoor con una precisione media di circa </a:t>
+            </a:r>
+            <a:r>
+              <a:rPr b="1" lang="it-IT"/>
+              <a:t>30cm</a:t>
+            </a:r>
+            <a:r>
+              <a:rPr lang="it-IT"/>
+              <a:t>.</a:t>
+            </a:r>
+            <a:endParaRPr/>
+          </a:p>
+          <a:p>
+            <a:pPr indent="-381000" lvl="0" marL="457200" rtl="0" algn="l">
+              <a:spcBef>
+                <a:spcPts val="0"/>
+              </a:spcBef>
+              <a:spcAft>
+                <a:spcPts val="0"/>
+              </a:spcAft>
+              <a:buSzPts val="2400"/>
+              <a:buChar char="●"/>
+            </a:pPr>
+            <a:r>
+              <a:rPr lang="it-IT"/>
+              <a:t>L’utilizzo di un ensemble di modelli ha ridotto l’errore medio a circa </a:t>
+            </a:r>
+            <a:r>
+              <a:rPr b="1" lang="it-IT"/>
+              <a:t>26cm</a:t>
+            </a:r>
+            <a:r>
+              <a:rPr lang="it-IT"/>
+              <a:t>.</a:t>
+            </a:r>
+            <a:endParaRPr/>
+          </a:p>
+          <a:p>
+            <a:pPr indent="-381000" lvl="0" marL="457200" rtl="0" algn="l">
+              <a:spcBef>
+                <a:spcPts val="0"/>
+              </a:spcBef>
+              <a:spcAft>
+                <a:spcPts val="0"/>
+              </a:spcAft>
+              <a:buSzPts val="2400"/>
+              <a:buChar char="●"/>
+            </a:pPr>
+            <a:r>
+              <a:rPr lang="it-IT"/>
+              <a:t>La stabilità del sistema e le risorse richieste per utilizzarlo lo rendono fruibile su sistemi mobile con ridotte capacità computazionali.</a:t>
+            </a:r>
+            <a:endParaRPr/>
+          </a:p>
+        </p:txBody>
+      </p:sp>
+      <p:sp>
+        <p:nvSpPr>
+          <p:cNvPr id="161" name="Google Shape;161;g866f9fc50c_0_220"/>
+          <p:cNvSpPr txBox="1"/>
+          <p:nvPr>
+            <p:ph type="title"/>
+          </p:nvPr>
+        </p:nvSpPr>
+        <p:spPr>
+          <a:xfrm>
+            <a:off x="245725" y="0"/>
+            <a:ext cx="5055900" cy="1207500"/>
+          </a:xfrm>
+          <a:prstGeom prst="rect">
+            <a:avLst/>
+          </a:prstGeom>
+        </p:spPr>
+        <p:txBody>
+          <a:bodyPr anchorCtr="0" anchor="ctr" bIns="91425" lIns="91425" spcFirstLastPara="1" rIns="91425" wrap="square" tIns="91425">
+            <a:noAutofit/>
+          </a:bodyPr>
+          <a:lstStyle/>
+          <a:p>
+            <a:pPr indent="0" lvl="0" marL="0" rtl="0" algn="l">
+              <a:spcBef>
+                <a:spcPts val="0"/>
+              </a:spcBef>
+              <a:spcAft>
+                <a:spcPts val="0"/>
+              </a:spcAft>
+              <a:buNone/>
+            </a:pPr>
+            <a:r>
+              <a:rPr lang="it-IT"/>
+              <a:t>Conclusioni</a:t>
+            </a:r>
+            <a:endParaRPr/>
+          </a:p>
+        </p:txBody>
+      </p:sp>
+    </p:spTree>
+  </p:cSld>
+  <p:clrMapOvr>
+    <a:masterClrMapping/>
+  </p:clrMapOvr>
+</p:sld>
+</file>
+
+<file path=ppt/slides/slide12.xml><?xml version="1.0" encoding="utf-8"?>
+<p:sld xmlns:a="http://schemas.openxmlformats.org/drawingml/2006/main" xmlns:r="http://schemas.openxmlformats.org/officeDocument/2006/relationships" xmlns:mc="http://schemas.openxmlformats.org/markup-compatibility/2006" xmlns:mv="urn:schemas-microsoft-com:mac:vml" xmlns:p="http://schemas.openxmlformats.org/presentationml/2006/main" xmlns:c="http://schemas.openxmlformats.org/drawingml/2006/chart" xmlns:dgm="http://schemas.openxmlformats.org/drawingml/2006/diagram" xmlns:o="urn:schemas-microsoft-com:office:office" xmlns:v="urn:schemas-microsoft-com:vml" xmlns:pvml="urn:schemas-microsoft-com:office:powerpoint" xmlns:com="http://schemas.openxmlformats.org/drawingml/2006/compatibility" xmlns:p14="http://schemas.microsoft.com/office/powerpoint/2010/main" xmlns:p15="http://schemas.microsoft.com/office/powerpoint/2012/main">
+  <p:cSld>
+    <p:spTree>
+      <p:nvGrpSpPr>
+        <p:cNvPr id="165" name="Shape 165"/>
+        <p:cNvGrpSpPr/>
+        <p:nvPr/>
+      </p:nvGrpSpPr>
+      <p:grpSpPr>
+        <a:xfrm>
+          <a:off x="0" y="0"/>
+          <a:ext cx="0" cy="0"/>
+          <a:chOff x="0" y="0"/>
+          <a:chExt cx="0" cy="0"/>
+        </a:xfrm>
+      </p:grpSpPr>
+      <p:sp>
+        <p:nvSpPr>
+          <p:cNvPr id="166" name="Google Shape;166;g866f9fc50c_0_225"/>
+          <p:cNvSpPr txBox="1"/>
+          <p:nvPr>
+            <p:ph idx="1" type="body"/>
+          </p:nvPr>
+        </p:nvSpPr>
+        <p:spPr>
+          <a:xfrm>
+            <a:off x="457200" y="1600200"/>
+            <a:ext cx="8229600" cy="4526100"/>
+          </a:xfrm>
+          <a:prstGeom prst="rect">
+            <a:avLst/>
+          </a:prstGeom>
+        </p:spPr>
+        <p:txBody>
+          <a:bodyPr anchorCtr="0" anchor="ctr" bIns="45700" lIns="91425" spcFirstLastPara="1" rIns="91425" wrap="square" tIns="45700">
+            <a:noAutofit/>
+          </a:bodyPr>
+          <a:lstStyle/>
+          <a:p>
+            <a:pPr indent="0" lvl="0" marL="0" rtl="0" algn="ctr">
+              <a:spcBef>
+                <a:spcPts val="360"/>
+              </a:spcBef>
+              <a:spcAft>
+                <a:spcPts val="0"/>
+              </a:spcAft>
+              <a:buNone/>
+            </a:pPr>
+            <a:r>
+              <a:rPr b="1" lang="it-IT" sz="4100">
+                <a:solidFill>
+                  <a:srgbClr val="434343"/>
+                </a:solidFill>
+              </a:rPr>
+              <a:t>Grazie</a:t>
+            </a:r>
+            <a:r>
+              <a:rPr b="1" lang="it-IT" sz="4100">
+                <a:solidFill>
+                  <a:srgbClr val="434343"/>
+                </a:solidFill>
+              </a:rPr>
+              <a:t> per l’attenzione</a:t>
+            </a:r>
+            <a:endParaRPr b="1" sz="4100">
+              <a:solidFill>
+                <a:srgbClr val="434343"/>
+              </a:solidFill>
+            </a:endParaRPr>
+          </a:p>
+        </p:txBody>
+      </p:sp>
+      <p:sp>
+        <p:nvSpPr>
+          <p:cNvPr id="167" name="Google Shape;167;g866f9fc50c_0_225"/>
+          <p:cNvSpPr txBox="1"/>
+          <p:nvPr>
+            <p:ph type="title"/>
+          </p:nvPr>
+        </p:nvSpPr>
+        <p:spPr>
+          <a:xfrm>
+            <a:off x="245725" y="0"/>
+            <a:ext cx="5055900" cy="1207500"/>
+          </a:xfrm>
+          <a:prstGeom prst="rect">
+            <a:avLst/>
+          </a:prstGeom>
+        </p:spPr>
+        <p:txBody>
+          <a:bodyPr anchorCtr="0" anchor="ctr" bIns="91425" lIns="91425" spcFirstLastPara="1" rIns="91425" wrap="square" tIns="91425">
+            <a:noAutofit/>
+          </a:bodyPr>
+          <a:lstStyle/>
+          <a:p>
+            <a:pPr indent="0" lvl="0" marL="0" rtl="0" algn="l">
+              <a:spcBef>
+                <a:spcPts val="0"/>
+              </a:spcBef>
+              <a:spcAft>
+                <a:spcPts val="0"/>
+              </a:spcAft>
+              <a:buNone/>
+            </a:pPr>
+            <a:r>
+              <a:rPr lang="it-IT"/>
+              <a:t>Ringraziamenti</a:t>
+            </a:r>
+            <a:endParaRPr/>
+          </a:p>
+        </p:txBody>
+      </p:sp>
+    </p:spTree>
+  </p:cSld>
+  <p:clrMapOvr>
+    <a:masterClrMapping/>
+  </p:clrMapOvr>
+</p:sld>
+</file>
+
 <file path=ppt/slides/slide2.xml><?xml version="1.0" encoding="utf-8"?>
 <p:sld xmlns:a="http://schemas.openxmlformats.org/drawingml/2006/main" xmlns:r="http://schemas.openxmlformats.org/officeDocument/2006/relationships" xmlns:mc="http://schemas.openxmlformats.org/markup-compatibility/2006" xmlns:mv="urn:schemas-microsoft-com:mac:vml" xmlns:p="http://schemas.openxmlformats.org/presentationml/2006/main" xmlns:c="http://schemas.openxmlformats.org/drawingml/2006/chart" xmlns:dgm="http://schemas.openxmlformats.org/drawingml/2006/diagram" xmlns:o="urn:schemas-microsoft-com:office:office" xmlns:v="urn:schemas-microsoft-com:vml" xmlns:pvml="urn:schemas-microsoft-com:office:powerpoint" xmlns:com="http://schemas.openxmlformats.org/drawingml/2006/compatibility" xmlns:p14="http://schemas.microsoft.com/office/powerpoint/2010/main" xmlns:p15="http://schemas.microsoft.com/office/powerpoint/2012/main">
   <p:cSld>
@@ -10923,8 +11648,8 @@
         </p:nvSpPr>
         <p:spPr>
           <a:xfrm>
-            <a:off x="457200" y="1600200"/>
-            <a:ext cx="8229600" cy="4526100"/>
+            <a:off x="245725" y="1484950"/>
+            <a:ext cx="4844400" cy="4526100"/>
           </a:xfrm>
           <a:prstGeom prst="rect">
             <a:avLst/>
@@ -10936,17 +11661,121 @@
           </a:bodyPr>
           <a:lstStyle/>
           <a:p>
-            <a:pPr indent="0" lvl="0" marL="0" rtl="0" algn="l">
+            <a:pPr indent="-381000" lvl="0" marL="457200" rtl="0" algn="l">
               <a:spcBef>
                 <a:spcPts val="360"/>
               </a:spcBef>
               <a:spcAft>
                 <a:spcPts val="0"/>
               </a:spcAft>
-              <a:buNone/>
+              <a:buSzPts val="2400"/>
+              <a:buChar char="●"/>
             </a:pPr>
             <a:r>
-              <a:t/>
+              <a:rPr lang="it-IT"/>
+              <a:t>I sistemi di Localizzazione Indoor sono oggetto di interesse in vari contesti:</a:t>
+            </a:r>
+            <a:endParaRPr/>
+          </a:p>
+          <a:p>
+            <a:pPr indent="-381000" lvl="1" marL="914400" rtl="0" algn="l">
+              <a:spcBef>
+                <a:spcPts val="0"/>
+              </a:spcBef>
+              <a:spcAft>
+                <a:spcPts val="0"/>
+              </a:spcAft>
+              <a:buSzPts val="2400"/>
+              <a:buChar char="○"/>
+            </a:pPr>
+            <a:r>
+              <a:rPr lang="it-IT"/>
+              <a:t>Navigazione guidata in edifici complessi</a:t>
+            </a:r>
+            <a:endParaRPr/>
+          </a:p>
+          <a:p>
+            <a:pPr indent="-381000" lvl="1" marL="914400" rtl="0" algn="l">
+              <a:spcBef>
+                <a:spcPts val="0"/>
+              </a:spcBef>
+              <a:spcAft>
+                <a:spcPts val="0"/>
+              </a:spcAft>
+              <a:buSzPts val="2400"/>
+              <a:buChar char="○"/>
+            </a:pPr>
+            <a:r>
+              <a:rPr lang="it-IT"/>
+              <a:t>Gestione dei flussi</a:t>
+            </a:r>
+            <a:endParaRPr/>
+          </a:p>
+          <a:p>
+            <a:pPr indent="-381000" lvl="1" marL="914400" rtl="0" algn="l">
+              <a:spcBef>
+                <a:spcPts val="0"/>
+              </a:spcBef>
+              <a:spcAft>
+                <a:spcPts val="0"/>
+              </a:spcAft>
+              <a:buSzPts val="2400"/>
+              <a:buChar char="○"/>
+            </a:pPr>
+            <a:r>
+              <a:rPr lang="it-IT"/>
+              <a:t>Contingentazione</a:t>
+            </a:r>
+            <a:endParaRPr/>
+          </a:p>
+          <a:p>
+            <a:pPr indent="-381000" lvl="0" marL="457200" rtl="0" algn="l">
+              <a:spcBef>
+                <a:spcPts val="0"/>
+              </a:spcBef>
+              <a:spcAft>
+                <a:spcPts val="0"/>
+              </a:spcAft>
+              <a:buSzPts val="2400"/>
+              <a:buChar char="●"/>
+            </a:pPr>
+            <a:r>
+              <a:rPr lang="it-IT"/>
+              <a:t>Diverse soluzioni al problema:</a:t>
+            </a:r>
+            <a:endParaRPr/>
+          </a:p>
+          <a:p>
+            <a:pPr indent="-381000" lvl="1" marL="914400" rtl="0" algn="l">
+              <a:spcBef>
+                <a:spcPts val="0"/>
+              </a:spcBef>
+              <a:spcAft>
+                <a:spcPts val="0"/>
+              </a:spcAft>
+              <a:buSzPts val="2400"/>
+              <a:buChar char="○"/>
+            </a:pPr>
+            <a:r>
+              <a:rPr lang="it-IT"/>
+              <a:t>Tecnologie e sensori ad-hoc</a:t>
+            </a:r>
+            <a:endParaRPr/>
+          </a:p>
+          <a:p>
+            <a:pPr indent="-381000" lvl="1" marL="914400" rtl="0" algn="l">
+              <a:spcBef>
+                <a:spcPts val="0"/>
+              </a:spcBef>
+              <a:spcAft>
+                <a:spcPts val="0"/>
+              </a:spcAft>
+              <a:buSzPts val="2400"/>
+              <a:buChar char="○"/>
+            </a:pPr>
+            <a:r>
+              <a:rPr lang="it-IT"/>
+              <a:t>Utilizzo di segnali wireless preesistenti</a:t>
             </a:r>
             <a:endParaRPr/>
           </a:p>
@@ -10992,6 +11821,33 @@
           </a:p>
         </p:txBody>
       </p:sp>
+      <p:pic>
+        <p:nvPicPr>
+          <p:cNvPr id="94" name="Google Shape;94;g866f9fc50c_0_160"/>
+          <p:cNvPicPr preferRelativeResize="0"/>
+          <p:nvPr/>
+        </p:nvPicPr>
+        <p:blipFill rotWithShape="1">
+          <a:blip r:embed="rId3">
+            <a:alphaModFix/>
+          </a:blip>
+          <a:srcRect b="22893" l="0" r="0" t="40389"/>
+          <a:stretch/>
+        </p:blipFill>
+        <p:spPr>
+          <a:xfrm>
+            <a:off x="5147946" y="1937500"/>
+            <a:ext cx="3904675" cy="2982999"/>
+          </a:xfrm>
+          <a:prstGeom prst="rect">
+            <a:avLst/>
+          </a:prstGeom>
+          <a:noFill/>
+          <a:ln>
+            <a:noFill/>
+          </a:ln>
+        </p:spPr>
+      </p:pic>
     </p:spTree>
   </p:cSld>
   <p:clrMapOvr>
@@ -11005,7 +11861,7 @@
   <p:cSld>
     <p:spTree>
       <p:nvGrpSpPr>
-        <p:cNvPr id="97" name="Shape 97"/>
+        <p:cNvPr id="98" name="Shape 98"/>
         <p:cNvGrpSpPr/>
         <p:nvPr/>
       </p:nvGrpSpPr>
@@ -11019,7 +11875,7 @@
       </p:grpSpPr>
       <p:sp>
         <p:nvSpPr>
-          <p:cNvPr id="98" name="Google Shape;98;g866f9fc50c_0_165"/>
+          <p:cNvPr id="99" name="Google Shape;99;g8c6def6be4_0_10"/>
           <p:cNvSpPr txBox="1"/>
           <p:nvPr>
             <p:ph idx="1" type="body"/>
@@ -11028,7 +11884,7 @@
         <p:spPr>
           <a:xfrm>
             <a:off x="457200" y="1600200"/>
-            <a:ext cx="8229600" cy="4526100"/>
+            <a:ext cx="8229600" cy="1915800"/>
           </a:xfrm>
           <a:prstGeom prst="rect">
             <a:avLst/>
@@ -11040,17 +11896,53 @@
           </a:bodyPr>
           <a:lstStyle/>
           <a:p>
-            <a:pPr indent="0" lvl="0" marL="0" rtl="0" algn="l">
+            <a:pPr indent="-381000" lvl="0" marL="457200" rtl="0" algn="l">
               <a:spcBef>
                 <a:spcPts val="360"/>
               </a:spcBef>
               <a:spcAft>
                 <a:spcPts val="0"/>
               </a:spcAft>
-              <a:buNone/>
+              <a:buSzPts val="2400"/>
+              <a:buChar char="●"/>
             </a:pPr>
             <a:r>
-              <a:t/>
+              <a:rPr lang="it-IT"/>
+              <a:t>La soluzione proposta sfrutta i segnali emessi da Beacon BLE e i relativi valori RSSI</a:t>
+            </a:r>
+            <a:endParaRPr/>
+          </a:p>
+          <a:p>
+            <a:pPr indent="-381000" lvl="0" marL="457200" rtl="0" algn="l">
+              <a:spcBef>
+                <a:spcPts val="0"/>
+              </a:spcBef>
+              <a:spcAft>
+                <a:spcPts val="0"/>
+              </a:spcAft>
+              <a:buSzPts val="2400"/>
+              <a:buChar char="●"/>
+            </a:pPr>
+            <a:r>
+              <a:rPr lang="it-IT"/>
+              <a:t>I Beacon sono disposti all’interno dell’edificio</a:t>
+            </a:r>
+            <a:endParaRPr/>
+          </a:p>
+          <a:p>
+            <a:pPr indent="-381000" lvl="0" marL="457200" rtl="0" algn="l">
+              <a:spcBef>
+                <a:spcPts val="0"/>
+              </a:spcBef>
+              <a:spcAft>
+                <a:spcPts val="0"/>
+              </a:spcAft>
+              <a:buSzPts val="2400"/>
+              <a:buChar char="●"/>
+            </a:pPr>
+            <a:r>
+              <a:rPr lang="it-IT"/>
+              <a:t>I segnali vengono raccolti registrandone la propagazione nell’edificio</a:t>
             </a:r>
             <a:endParaRPr/>
           </a:p>
@@ -11058,7 +11950,7 @@
       </p:sp>
       <p:sp>
         <p:nvSpPr>
-          <p:cNvPr id="99" name="Google Shape;99;g866f9fc50c_0_165"/>
+          <p:cNvPr id="100" name="Google Shape;100;g8c6def6be4_0_10"/>
           <p:cNvSpPr txBox="1"/>
           <p:nvPr>
             <p:ph type="title"/>
@@ -11090,9 +11982,130 @@
             </a:pPr>
             <a:r>
               <a:rPr lang="it-IT"/>
-              <a:t>Deep Learning</a:t>
+              <a:t>Bluetooth Low Energy</a:t>
             </a:r>
             <a:endParaRPr/>
+          </a:p>
+        </p:txBody>
+      </p:sp>
+      <p:pic>
+        <p:nvPicPr>
+          <p:cNvPr id="101" name="Google Shape;101;g8c6def6be4_0_10"/>
+          <p:cNvPicPr preferRelativeResize="0"/>
+          <p:nvPr/>
+        </p:nvPicPr>
+        <p:blipFill rotWithShape="1">
+          <a:blip r:embed="rId3">
+            <a:alphaModFix/>
+          </a:blip>
+          <a:srcRect b="16307" l="0" r="0" t="29205"/>
+          <a:stretch/>
+        </p:blipFill>
+        <p:spPr>
+          <a:xfrm>
+            <a:off x="6174325" y="3304575"/>
+            <a:ext cx="2512474" cy="2843098"/>
+          </a:xfrm>
+          <a:prstGeom prst="rect">
+            <a:avLst/>
+          </a:prstGeom>
+          <a:noFill/>
+          <a:ln>
+            <a:noFill/>
+          </a:ln>
+        </p:spPr>
+      </p:pic>
+      <p:sp>
+        <p:nvSpPr>
+          <p:cNvPr id="102" name="Google Shape;102;g8c6def6be4_0_10"/>
+          <p:cNvSpPr txBox="1"/>
+          <p:nvPr/>
+        </p:nvSpPr>
+        <p:spPr>
+          <a:xfrm>
+            <a:off x="457200" y="3650350"/>
+            <a:ext cx="5590800" cy="2497200"/>
+          </a:xfrm>
+          <a:prstGeom prst="rect">
+            <a:avLst/>
+          </a:prstGeom>
+          <a:noFill/>
+          <a:ln>
+            <a:noFill/>
+          </a:ln>
+        </p:spPr>
+        <p:txBody>
+          <a:bodyPr anchorCtr="0" anchor="t" bIns="91425" lIns="91425" spcFirstLastPara="1" rIns="91425" wrap="square" tIns="91425">
+            <a:noAutofit/>
+          </a:bodyPr>
+          <a:lstStyle/>
+          <a:p>
+            <a:pPr indent="-381000" lvl="0" marL="457200" rtl="0" algn="l">
+              <a:spcBef>
+                <a:spcPts val="0"/>
+              </a:spcBef>
+              <a:spcAft>
+                <a:spcPts val="0"/>
+              </a:spcAft>
+              <a:buSzPts val="2400"/>
+              <a:buChar char="●"/>
+            </a:pPr>
+            <a:r>
+              <a:rPr lang="it-IT" sz="2400"/>
+              <a:t>Si cerca di trovare un modello che utilizzi i valori RSSI per predire la posizione dell’utente</a:t>
+            </a:r>
+            <a:endParaRPr sz="2400"/>
+          </a:p>
+          <a:p>
+            <a:pPr indent="-381000" lvl="0" marL="457200" rtl="0" algn="l">
+              <a:spcBef>
+                <a:spcPts val="0"/>
+              </a:spcBef>
+              <a:spcAft>
+                <a:spcPts val="0"/>
+              </a:spcAft>
+              <a:buSzPts val="2400"/>
+              <a:buChar char="●"/>
+            </a:pPr>
+            <a:r>
+              <a:rPr lang="it-IT" sz="2400"/>
+              <a:t>Vari approcci possibili:</a:t>
+            </a:r>
+            <a:endParaRPr sz="2400"/>
+          </a:p>
+          <a:p>
+            <a:pPr indent="-381000" lvl="1" marL="914400" rtl="0" algn="l">
+              <a:spcBef>
+                <a:spcPts val="0"/>
+              </a:spcBef>
+              <a:spcAft>
+                <a:spcPts val="0"/>
+              </a:spcAft>
+              <a:buSzPts val="2400"/>
+              <a:buChar char="○"/>
+            </a:pPr>
+            <a:r>
+              <a:rPr lang="it-IT" sz="2400"/>
+              <a:t>Machine Learning</a:t>
+            </a:r>
+            <a:endParaRPr sz="2400"/>
+          </a:p>
+          <a:p>
+            <a:pPr indent="-381000" lvl="1" marL="914400" rtl="0" algn="l">
+              <a:spcBef>
+                <a:spcPts val="0"/>
+              </a:spcBef>
+              <a:spcAft>
+                <a:spcPts val="0"/>
+              </a:spcAft>
+              <a:buSzPts val="2400"/>
+              <a:buChar char="○"/>
+            </a:pPr>
+            <a:r>
+              <a:rPr lang="it-IT" sz="2400"/>
+              <a:t>Triangolazione (poco efficace)</a:t>
+            </a:r>
+            <a:endParaRPr sz="2400"/>
           </a:p>
         </p:txBody>
       </p:sp>
@@ -11109,7 +12122,7 @@
   <p:cSld>
     <p:spTree>
       <p:nvGrpSpPr>
-        <p:cNvPr id="103" name="Shape 103"/>
+        <p:cNvPr id="106" name="Shape 106"/>
         <p:cNvGrpSpPr/>
         <p:nvPr/>
       </p:nvGrpSpPr>
@@ -11123,7 +12136,82 @@
       </p:grpSpPr>
       <p:sp>
         <p:nvSpPr>
-          <p:cNvPr id="104" name="Google Shape;104;g866f9fc50c_0_170"/>
+          <p:cNvPr id="107" name="Google Shape;107;g866f9fc50c_0_165"/>
+          <p:cNvSpPr txBox="1"/>
+          <p:nvPr>
+            <p:ph idx="1" type="body"/>
+          </p:nvPr>
+        </p:nvSpPr>
+        <p:spPr>
+          <a:xfrm>
+            <a:off x="457200" y="1600200"/>
+            <a:ext cx="8229600" cy="2722500"/>
+          </a:xfrm>
+          <a:prstGeom prst="rect">
+            <a:avLst/>
+          </a:prstGeom>
+        </p:spPr>
+        <p:txBody>
+          <a:bodyPr anchorCtr="0" anchor="t" bIns="45700" lIns="91425" spcFirstLastPara="1" rIns="91425" wrap="square" tIns="45700">
+            <a:noAutofit/>
+          </a:bodyPr>
+          <a:lstStyle/>
+          <a:p>
+            <a:pPr indent="-381000" lvl="0" marL="457200" rtl="0" algn="l">
+              <a:spcBef>
+                <a:spcPts val="360"/>
+              </a:spcBef>
+              <a:spcAft>
+                <a:spcPts val="0"/>
+              </a:spcAft>
+              <a:buSzPts val="2400"/>
+              <a:buChar char="●"/>
+            </a:pPr>
+            <a:r>
+              <a:rPr lang="it-IT"/>
+              <a:t>Il Deep Learning è un insieme di tecniche e algoritmi per approssimare funzioni</a:t>
+            </a:r>
+            <a:endParaRPr/>
+          </a:p>
+          <a:p>
+            <a:pPr indent="-381000" lvl="0" marL="457200" rtl="0" algn="l">
+              <a:spcBef>
+                <a:spcPts val="0"/>
+              </a:spcBef>
+              <a:spcAft>
+                <a:spcPts val="0"/>
+              </a:spcAft>
+              <a:buSzPts val="2400"/>
+              <a:buChar char="●"/>
+            </a:pPr>
+            <a:r>
+              <a:rPr lang="it-IT"/>
+              <a:t>Una rete neurale è un modello matematico capace di apprendere dai dati</a:t>
+            </a:r>
+            <a:endParaRPr/>
+          </a:p>
+          <a:p>
+            <a:pPr indent="-381000" lvl="0" marL="457200" rtl="0" algn="l">
+              <a:spcBef>
+                <a:spcPts val="0"/>
+              </a:spcBef>
+              <a:spcAft>
+                <a:spcPts val="0"/>
+              </a:spcAft>
+              <a:buSzPts val="2400"/>
+              <a:buChar char="●"/>
+            </a:pPr>
+            <a:r>
+              <a:rPr lang="it-IT"/>
+              <a:t>La soluzione proposta utilizza una serie di reti neurali convoluzionali (CNN) e di multi layer perceptron (MLP)</a:t>
+            </a:r>
+            <a:endParaRPr/>
+          </a:p>
+        </p:txBody>
+      </p:sp>
+      <p:sp>
+        <p:nvSpPr>
+          <p:cNvPr id="108" name="Google Shape;108;g866f9fc50c_0_165"/>
           <p:cNvSpPr txBox="1"/>
           <p:nvPr>
             <p:ph type="title"/>
@@ -11155,7 +12243,7 @@
             </a:pPr>
             <a:r>
               <a:rPr lang="it-IT"/>
-              <a:t>Architettura</a:t>
+              <a:t>Deep Learning</a:t>
             </a:r>
             <a:endParaRPr/>
           </a:p>
@@ -11163,7 +12251,7 @@
       </p:sp>
       <p:pic>
         <p:nvPicPr>
-          <p:cNvPr id="105" name="Google Shape;105;g866f9fc50c_0_170"/>
+          <p:cNvPr id="109" name="Google Shape;109;g866f9fc50c_0_165"/>
           <p:cNvPicPr preferRelativeResize="0"/>
           <p:nvPr/>
         </p:nvPicPr>
@@ -11177,8 +12265,8 @@
         </p:blipFill>
         <p:spPr>
           <a:xfrm>
-            <a:off x="152400" y="1359900"/>
-            <a:ext cx="8839200" cy="4830411"/>
+            <a:off x="3694725" y="4072975"/>
+            <a:ext cx="1754553" cy="2230501"/>
           </a:xfrm>
           <a:prstGeom prst="rect">
             <a:avLst/>
@@ -11202,7 +12290,7 @@
   <p:cSld>
     <p:spTree>
       <p:nvGrpSpPr>
-        <p:cNvPr id="109" name="Shape 109"/>
+        <p:cNvPr id="113" name="Shape 113"/>
         <p:cNvGrpSpPr/>
         <p:nvPr/>
       </p:nvGrpSpPr>
@@ -11216,7 +12304,7 @@
       </p:grpSpPr>
       <p:sp>
         <p:nvSpPr>
-          <p:cNvPr id="110" name="Google Shape;110;g866f9fc50c_0_175"/>
+          <p:cNvPr id="114" name="Google Shape;114;g8c6def6be4_0_17"/>
           <p:cNvSpPr txBox="1"/>
           <p:nvPr>
             <p:ph idx="1" type="body"/>
@@ -11225,7 +12313,7 @@
         <p:spPr>
           <a:xfrm>
             <a:off x="457200" y="1600200"/>
-            <a:ext cx="8229600" cy="4526100"/>
+            <a:ext cx="8229600" cy="1828800"/>
           </a:xfrm>
           <a:prstGeom prst="rect">
             <a:avLst/>
@@ -11237,17 +12325,44 @@
           </a:bodyPr>
           <a:lstStyle/>
           <a:p>
-            <a:pPr indent="0" lvl="0" marL="0" rtl="0" algn="l">
+            <a:pPr indent="-381000" lvl="0" marL="457200" rtl="0" algn="l">
               <a:spcBef>
                 <a:spcPts val="360"/>
               </a:spcBef>
               <a:spcAft>
                 <a:spcPts val="0"/>
               </a:spcAft>
-              <a:buNone/>
+              <a:buSzPts val="2400"/>
+              <a:buChar char="●"/>
             </a:pPr>
             <a:r>
-              <a:t/>
+              <a:rPr lang="it-IT"/>
+              <a:t>Le reti neurali convoluzionali (CNN) applicano l’operazione di convoluzione all’input</a:t>
+            </a:r>
+            <a:endParaRPr/>
+          </a:p>
+          <a:p>
+            <a:pPr indent="-381000" lvl="0" marL="457200" rtl="0" algn="l">
+              <a:spcBef>
+                <a:spcPts val="0"/>
+              </a:spcBef>
+              <a:spcAft>
+                <a:spcPts val="0"/>
+              </a:spcAft>
+              <a:buSzPts val="2400"/>
+              <a:buChar char="●"/>
+            </a:pPr>
+            <a:r>
+              <a:rPr lang="it-IT"/>
+              <a:t>Vengono prodotte diverse </a:t>
+            </a:r>
+            <a:r>
+              <a:rPr i="1" lang="it-IT"/>
+              <a:t>feature map </a:t>
+            </a:r>
+            <a:r>
+              <a:rPr lang="it-IT"/>
+              <a:t>a partire da un input (in figura l’applicazione di un filtro bidimensionale)</a:t>
             </a:r>
             <a:endParaRPr/>
           </a:p>
@@ -11255,7 +12370,7 @@
       </p:sp>
       <p:sp>
         <p:nvSpPr>
-          <p:cNvPr id="111" name="Google Shape;111;g866f9fc50c_0_175"/>
+          <p:cNvPr id="115" name="Google Shape;115;g8c6def6be4_0_17"/>
           <p:cNvSpPr txBox="1"/>
           <p:nvPr>
             <p:ph type="title"/>
@@ -11287,12 +12402,40 @@
             </a:pPr>
             <a:r>
               <a:rPr lang="it-IT"/>
-              <a:t>Data Augmentation</a:t>
+              <a:t>Reti Convoluzionali</a:t>
             </a:r>
             <a:endParaRPr/>
           </a:p>
         </p:txBody>
       </p:sp>
+      <p:pic>
+        <p:nvPicPr>
+          <p:cNvPr id="116" name="Google Shape;116;g8c6def6be4_0_17"/>
+          <p:cNvPicPr preferRelativeResize="0"/>
+          <p:nvPr/>
+        </p:nvPicPr>
+        <p:blipFill>
+          <a:blip r:embed="rId3">
+            <a:alphaModFix/>
+          </a:blip>
+          <a:stretch>
+            <a:fillRect/>
+          </a:stretch>
+        </p:blipFill>
+        <p:spPr>
+          <a:xfrm>
+            <a:off x="1375025" y="3588347"/>
+            <a:ext cx="6393926" cy="2537950"/>
+          </a:xfrm>
+          <a:prstGeom prst="rect">
+            <a:avLst/>
+          </a:prstGeom>
+          <a:noFill/>
+          <a:ln>
+            <a:noFill/>
+          </a:ln>
+        </p:spPr>
+      </p:pic>
     </p:spTree>
   </p:cSld>
   <p:clrMapOvr>
@@ -11306,7 +12449,7 @@
   <p:cSld>
     <p:spTree>
       <p:nvGrpSpPr>
-        <p:cNvPr id="115" name="Shape 115"/>
+        <p:cNvPr id="120" name="Shape 120"/>
         <p:cNvGrpSpPr/>
         <p:nvPr/>
       </p:nvGrpSpPr>
@@ -11320,46 +12463,7 @@
       </p:grpSpPr>
       <p:sp>
         <p:nvSpPr>
-          <p:cNvPr id="116" name="Google Shape;116;g866f9fc50c_0_180"/>
-          <p:cNvSpPr txBox="1"/>
-          <p:nvPr>
-            <p:ph idx="1" type="body"/>
-          </p:nvPr>
-        </p:nvSpPr>
-        <p:spPr>
-          <a:xfrm>
-            <a:off x="457200" y="1600200"/>
-            <a:ext cx="8229600" cy="4526100"/>
-          </a:xfrm>
-          <a:prstGeom prst="rect">
-            <a:avLst/>
-          </a:prstGeom>
-        </p:spPr>
-        <p:txBody>
-          <a:bodyPr anchorCtr="0" anchor="t" bIns="45700" lIns="91425" spcFirstLastPara="1" rIns="91425" wrap="square" tIns="45700">
-            <a:noAutofit/>
-          </a:bodyPr>
-          <a:lstStyle/>
-          <a:p>
-            <a:pPr indent="0" lvl="0" marL="0" rtl="0" algn="l">
-              <a:spcBef>
-                <a:spcPts val="360"/>
-              </a:spcBef>
-              <a:spcAft>
-                <a:spcPts val="0"/>
-              </a:spcAft>
-              <a:buNone/>
-            </a:pPr>
-            <a:r>
-              <a:t/>
-            </a:r>
-            <a:endParaRPr/>
-          </a:p>
-        </p:txBody>
-      </p:sp>
-      <p:sp>
-        <p:nvSpPr>
-          <p:cNvPr id="117" name="Google Shape;117;g866f9fc50c_0_180"/>
+          <p:cNvPr id="121" name="Google Shape;121;g866f9fc50c_0_170"/>
           <p:cNvSpPr txBox="1"/>
           <p:nvPr>
             <p:ph type="title"/>
@@ -11391,9 +12495,233 @@
             </a:pPr>
             <a:r>
               <a:rPr lang="it-IT"/>
-              <a:t>Applicazione Mobile</a:t>
+              <a:t>Architettura</a:t>
             </a:r>
             <a:endParaRPr/>
+          </a:p>
+        </p:txBody>
+      </p:sp>
+      <p:pic>
+        <p:nvPicPr>
+          <p:cNvPr id="122" name="Google Shape;122;g866f9fc50c_0_170"/>
+          <p:cNvPicPr preferRelativeResize="0"/>
+          <p:nvPr/>
+        </p:nvPicPr>
+        <p:blipFill rotWithShape="1">
+          <a:blip r:embed="rId3">
+            <a:alphaModFix/>
+          </a:blip>
+          <a:srcRect b="0" l="49" r="39" t="0"/>
+          <a:stretch/>
+        </p:blipFill>
+        <p:spPr>
+          <a:xfrm>
+            <a:off x="1332650" y="1294650"/>
+            <a:ext cx="7811350" cy="4268725"/>
+          </a:xfrm>
+          <a:prstGeom prst="rect">
+            <a:avLst/>
+          </a:prstGeom>
+          <a:noFill/>
+          <a:ln>
+            <a:noFill/>
+          </a:ln>
+        </p:spPr>
+      </p:pic>
+      <p:sp>
+        <p:nvSpPr>
+          <p:cNvPr id="123" name="Google Shape;123;g866f9fc50c_0_170"/>
+          <p:cNvSpPr txBox="1"/>
+          <p:nvPr/>
+        </p:nvSpPr>
+        <p:spPr>
+          <a:xfrm>
+            <a:off x="227475" y="1325950"/>
+            <a:ext cx="5055900" cy="1325400"/>
+          </a:xfrm>
+          <a:prstGeom prst="rect">
+            <a:avLst/>
+          </a:prstGeom>
+          <a:noFill/>
+          <a:ln>
+            <a:noFill/>
+          </a:ln>
+        </p:spPr>
+        <p:txBody>
+          <a:bodyPr anchorCtr="0" anchor="t" bIns="91425" lIns="91425" spcFirstLastPara="1" rIns="91425" wrap="square" tIns="91425">
+            <a:noAutofit/>
+          </a:bodyPr>
+          <a:lstStyle/>
+          <a:p>
+            <a:pPr indent="0" lvl="0" marL="0" rtl="0" algn="l">
+              <a:spcBef>
+                <a:spcPts val="0"/>
+              </a:spcBef>
+              <a:spcAft>
+                <a:spcPts val="0"/>
+              </a:spcAft>
+              <a:buNone/>
+            </a:pPr>
+            <a:r>
+              <a:rPr b="1" lang="it-IT" sz="2400">
+                <a:solidFill>
+                  <a:srgbClr val="434343"/>
+                </a:solidFill>
+              </a:rPr>
+              <a:t>Topologia della rete neurale sviluppata</a:t>
+            </a:r>
+            <a:endParaRPr b="1" sz="2400">
+              <a:solidFill>
+                <a:srgbClr val="434343"/>
+              </a:solidFill>
+            </a:endParaRPr>
+          </a:p>
+        </p:txBody>
+      </p:sp>
+      <p:sp>
+        <p:nvSpPr>
+          <p:cNvPr id="124" name="Google Shape;124;g866f9fc50c_0_170"/>
+          <p:cNvSpPr txBox="1"/>
+          <p:nvPr/>
+        </p:nvSpPr>
+        <p:spPr>
+          <a:xfrm>
+            <a:off x="245725" y="4071150"/>
+            <a:ext cx="8898300" cy="2268600"/>
+          </a:xfrm>
+          <a:prstGeom prst="rect">
+            <a:avLst/>
+          </a:prstGeom>
+          <a:noFill/>
+          <a:ln>
+            <a:noFill/>
+          </a:ln>
+        </p:spPr>
+        <p:txBody>
+          <a:bodyPr anchorCtr="0" anchor="t" bIns="91425" lIns="91425" spcFirstLastPara="1" rIns="91425" wrap="square" tIns="91425">
+            <a:noAutofit/>
+          </a:bodyPr>
+          <a:lstStyle/>
+          <a:p>
+            <a:pPr indent="-355600" lvl="0" marL="457200" rtl="0" algn="l">
+              <a:spcBef>
+                <a:spcPts val="0"/>
+              </a:spcBef>
+              <a:spcAft>
+                <a:spcPts val="0"/>
+              </a:spcAft>
+              <a:buSzPts val="2000"/>
+              <a:buChar char="●"/>
+            </a:pPr>
+            <a:r>
+              <a:rPr lang="it-IT" sz="2000"/>
+              <a:t>Input principale e input ausiliari</a:t>
+            </a:r>
+            <a:endParaRPr sz="2000"/>
+          </a:p>
+          <a:p>
+            <a:pPr indent="-355600" lvl="1" marL="914400" rtl="0" algn="l">
+              <a:spcBef>
+                <a:spcPts val="0"/>
+              </a:spcBef>
+              <a:spcAft>
+                <a:spcPts val="0"/>
+              </a:spcAft>
+              <a:buSzPts val="2000"/>
+              <a:buChar char="○"/>
+            </a:pPr>
+            <a:r>
+              <a:rPr lang="it-IT" sz="2000"/>
+              <a:t>Sensore magnetico (𝛼)</a:t>
+            </a:r>
+            <a:endParaRPr sz="2000"/>
+          </a:p>
+          <a:p>
+            <a:pPr indent="-355600" lvl="1" marL="914400" rtl="0" algn="l">
+              <a:spcBef>
+                <a:spcPts val="0"/>
+              </a:spcBef>
+              <a:spcAft>
+                <a:spcPts val="0"/>
+              </a:spcAft>
+              <a:buSzPts val="2000"/>
+              <a:buChar char="○"/>
+            </a:pPr>
+            <a:r>
+              <a:rPr lang="it-IT" sz="2000"/>
+              <a:t>Posizione precedente dell’utente (</a:t>
+            </a:r>
+            <a:r>
+              <a:rPr lang="it-IT" sz="2000"/>
+              <a:t>𝘺</a:t>
+            </a:r>
+            <a:r>
+              <a:rPr baseline="-25000" lang="it-IT" sz="2000"/>
+              <a:t>old</a:t>
+            </a:r>
+            <a:r>
+              <a:rPr lang="it-IT" sz="2000"/>
+              <a:t>)</a:t>
+            </a:r>
+            <a:endParaRPr sz="2000"/>
+          </a:p>
+          <a:p>
+            <a:pPr indent="-355600" lvl="1" marL="914400" rtl="0" algn="l">
+              <a:spcBef>
+                <a:spcPts val="0"/>
+              </a:spcBef>
+              <a:spcAft>
+                <a:spcPts val="0"/>
+              </a:spcAft>
+              <a:buClr>
+                <a:schemeClr val="dk1"/>
+              </a:buClr>
+              <a:buSzPts val="2000"/>
+              <a:buChar char="○"/>
+            </a:pPr>
+            <a:r>
+              <a:rPr lang="it-IT" sz="2000">
+                <a:solidFill>
+                  <a:schemeClr val="dk1"/>
+                </a:solidFill>
+              </a:rPr>
+              <a:t>Coefficiente memoria residua (𝜇)</a:t>
+            </a:r>
+            <a:endParaRPr sz="2000"/>
+          </a:p>
+          <a:p>
+            <a:pPr indent="-355600" lvl="0" marL="457200" rtl="0" algn="l">
+              <a:spcBef>
+                <a:spcPts val="0"/>
+              </a:spcBef>
+              <a:spcAft>
+                <a:spcPts val="0"/>
+              </a:spcAft>
+              <a:buSzPts val="2000"/>
+              <a:buChar char="●"/>
+            </a:pPr>
+            <a:r>
+              <a:rPr lang="it-IT" sz="2000"/>
+              <a:t>Layer convoluzionali</a:t>
+            </a:r>
+            <a:endParaRPr sz="2000"/>
+          </a:p>
+          <a:p>
+            <a:pPr indent="-355600" lvl="0" marL="457200" rtl="0" algn="l">
+              <a:spcBef>
+                <a:spcPts val="0"/>
+              </a:spcBef>
+              <a:spcAft>
+                <a:spcPts val="0"/>
+              </a:spcAft>
+              <a:buSzPts val="2000"/>
+              <a:buChar char="●"/>
+            </a:pPr>
+            <a:r>
+              <a:rPr lang="it-IT" sz="2000"/>
+              <a:t>Output principale e output ausiliario</a:t>
+            </a:r>
+            <a:endParaRPr sz="2000"/>
           </a:p>
         </p:txBody>
       </p:sp>
@@ -11410,7 +12738,7 @@
   <p:cSld>
     <p:spTree>
       <p:nvGrpSpPr>
-        <p:cNvPr id="121" name="Shape 121"/>
+        <p:cNvPr id="128" name="Shape 128"/>
         <p:cNvGrpSpPr/>
         <p:nvPr/>
       </p:nvGrpSpPr>
@@ -11424,7 +12752,7 @@
       </p:grpSpPr>
       <p:sp>
         <p:nvSpPr>
-          <p:cNvPr id="122" name="Google Shape;122;g866f9fc50c_0_185"/>
+          <p:cNvPr id="129" name="Google Shape;129;g866f9fc50c_0_175"/>
           <p:cNvSpPr txBox="1"/>
           <p:nvPr>
             <p:ph idx="1" type="body"/>
@@ -11433,7 +12761,7 @@
         <p:spPr>
           <a:xfrm>
             <a:off x="457200" y="1600200"/>
-            <a:ext cx="8229600" cy="4526100"/>
+            <a:ext cx="8229600" cy="2664900"/>
           </a:xfrm>
           <a:prstGeom prst="rect">
             <a:avLst/>
@@ -11445,17 +12773,70 @@
           </a:bodyPr>
           <a:lstStyle/>
           <a:p>
-            <a:pPr indent="0" lvl="0" marL="0" rtl="0" algn="l">
+            <a:pPr indent="-381000" lvl="0" marL="457200" rtl="0" algn="l">
               <a:spcBef>
                 <a:spcPts val="360"/>
               </a:spcBef>
               <a:spcAft>
                 <a:spcPts val="0"/>
               </a:spcAft>
-              <a:buNone/>
+              <a:buSzPts val="2400"/>
+              <a:buChar char="●"/>
             </a:pPr>
             <a:r>
-              <a:t/>
+              <a:rPr lang="it-IT"/>
+              <a:t>Varie criticità dovute all’approccio data-driven della soluzione proposta:</a:t>
+            </a:r>
+            <a:endParaRPr/>
+          </a:p>
+          <a:p>
+            <a:pPr indent="-381000" lvl="1" marL="914400" rtl="0" algn="l">
+              <a:spcBef>
+                <a:spcPts val="0"/>
+              </a:spcBef>
+              <a:spcAft>
+                <a:spcPts val="0"/>
+              </a:spcAft>
+              <a:buSzPts val="2400"/>
+              <a:buChar char="○"/>
+            </a:pPr>
+            <a:r>
+              <a:rPr lang="it-IT"/>
+              <a:t>Difficoltà nella raccolta dati (dataset limitato)</a:t>
+            </a:r>
+            <a:endParaRPr/>
+          </a:p>
+          <a:p>
+            <a:pPr indent="-381000" lvl="1" marL="914400" rtl="0" algn="l">
+              <a:spcBef>
+                <a:spcPts val="0"/>
+              </a:spcBef>
+              <a:spcAft>
+                <a:spcPts val="0"/>
+              </a:spcAft>
+              <a:buSzPts val="2400"/>
+              <a:buChar char="○"/>
+            </a:pPr>
+            <a:r>
+              <a:rPr lang="it-IT"/>
+              <a:t>Dati incostanti (rumore di fondo e perturbazione dei segnali)</a:t>
+            </a:r>
+            <a:endParaRPr/>
+          </a:p>
+          <a:p>
+            <a:pPr indent="-381000" lvl="0" marL="457200" rtl="0" algn="l">
+              <a:spcBef>
+                <a:spcPts val="0"/>
+              </a:spcBef>
+              <a:spcAft>
+                <a:spcPts val="0"/>
+              </a:spcAft>
+              <a:buSzPts val="2400"/>
+              <a:buChar char="●"/>
+            </a:pPr>
+            <a:r>
+              <a:rPr lang="it-IT"/>
+              <a:t>Vengono proposte varie tecniche di arricchimento dei dati per risolvere questi problemi</a:t>
             </a:r>
             <a:endParaRPr/>
           </a:p>
@@ -11463,7 +12844,7 @@
       </p:sp>
       <p:sp>
         <p:nvSpPr>
-          <p:cNvPr id="123" name="Google Shape;123;g866f9fc50c_0_185"/>
+          <p:cNvPr id="130" name="Google Shape;130;g866f9fc50c_0_175"/>
           <p:cNvSpPr txBox="1"/>
           <p:nvPr>
             <p:ph type="title"/>
@@ -11495,12 +12876,68 @@
             </a:pPr>
             <a:r>
               <a:rPr lang="it-IT"/>
-              <a:t>Risultati Sperimentali</a:t>
+              <a:t>Data Augmentation</a:t>
             </a:r>
             <a:endParaRPr/>
           </a:p>
         </p:txBody>
       </p:sp>
+      <p:pic>
+        <p:nvPicPr>
+          <p:cNvPr id="131" name="Google Shape;131;g866f9fc50c_0_175"/>
+          <p:cNvPicPr preferRelativeResize="0"/>
+          <p:nvPr/>
+        </p:nvPicPr>
+        <p:blipFill>
+          <a:blip r:embed="rId3">
+            <a:alphaModFix/>
+          </a:blip>
+          <a:stretch>
+            <a:fillRect/>
+          </a:stretch>
+        </p:blipFill>
+        <p:spPr>
+          <a:xfrm>
+            <a:off x="1577313" y="4359900"/>
+            <a:ext cx="2929644" cy="1953100"/>
+          </a:xfrm>
+          <a:prstGeom prst="rect">
+            <a:avLst/>
+          </a:prstGeom>
+          <a:noFill/>
+          <a:ln>
+            <a:noFill/>
+          </a:ln>
+        </p:spPr>
+      </p:pic>
+      <p:pic>
+        <p:nvPicPr>
+          <p:cNvPr id="132" name="Google Shape;132;g866f9fc50c_0_175"/>
+          <p:cNvPicPr preferRelativeResize="0"/>
+          <p:nvPr/>
+        </p:nvPicPr>
+        <p:blipFill>
+          <a:blip r:embed="rId4">
+            <a:alphaModFix/>
+          </a:blip>
+          <a:stretch>
+            <a:fillRect/>
+          </a:stretch>
+        </p:blipFill>
+        <p:spPr>
+          <a:xfrm>
+            <a:off x="4637044" y="4359900"/>
+            <a:ext cx="2929644" cy="1953100"/>
+          </a:xfrm>
+          <a:prstGeom prst="rect">
+            <a:avLst/>
+          </a:prstGeom>
+          <a:noFill/>
+          <a:ln>
+            <a:noFill/>
+          </a:ln>
+        </p:spPr>
+      </p:pic>
     </p:spTree>
   </p:cSld>
   <p:clrMapOvr>
@@ -11514,7 +12951,7 @@
   <p:cSld>
     <p:spTree>
       <p:nvGrpSpPr>
-        <p:cNvPr id="127" name="Shape 127"/>
+        <p:cNvPr id="136" name="Shape 136"/>
         <p:cNvGrpSpPr/>
         <p:nvPr/>
       </p:nvGrpSpPr>
@@ -11528,7 +12965,7 @@
       </p:grpSpPr>
       <p:sp>
         <p:nvSpPr>
-          <p:cNvPr id="128" name="Google Shape;128;g866f9fc50c_0_220"/>
+          <p:cNvPr id="137" name="Google Shape;137;g8c6def6be4_0_39"/>
           <p:cNvSpPr txBox="1"/>
           <p:nvPr>
             <p:ph idx="1" type="body"/>
@@ -11549,6 +12986,112 @@
           </a:bodyPr>
           <a:lstStyle/>
           <a:p>
+            <a:pPr indent="-381000" lvl="0" marL="457200" rtl="0" algn="l">
+              <a:spcBef>
+                <a:spcPts val="360"/>
+              </a:spcBef>
+              <a:spcAft>
+                <a:spcPts val="0"/>
+              </a:spcAft>
+              <a:buSzPts val="2400"/>
+              <a:buChar char="●"/>
+            </a:pPr>
+            <a:r>
+              <a:rPr lang="it-IT"/>
+              <a:t>I segnali wireless sono naturalmente soggetti a rumore</a:t>
+            </a:r>
+            <a:endParaRPr/>
+          </a:p>
+          <a:p>
+            <a:pPr indent="-381000" lvl="0" marL="457200" rtl="0" algn="l">
+              <a:spcBef>
+                <a:spcPts val="0"/>
+              </a:spcBef>
+              <a:spcAft>
+                <a:spcPts val="0"/>
+              </a:spcAft>
+              <a:buSzPts val="2400"/>
+              <a:buChar char="●"/>
+            </a:pPr>
+            <a:r>
+              <a:rPr lang="it-IT"/>
+              <a:t>Questo fa sì che l’output del modello subisca delle fluttuazioni</a:t>
+            </a:r>
+            <a:endParaRPr/>
+          </a:p>
+          <a:p>
+            <a:pPr indent="-381000" lvl="0" marL="457200" rtl="0" algn="l">
+              <a:spcBef>
+                <a:spcPts val="0"/>
+              </a:spcBef>
+              <a:spcAft>
+                <a:spcPts val="0"/>
+              </a:spcAft>
+              <a:buSzPts val="2400"/>
+              <a:buChar char="●"/>
+            </a:pPr>
+            <a:r>
+              <a:rPr lang="it-IT"/>
+              <a:t>Possibili soluzioni:</a:t>
+            </a:r>
+            <a:endParaRPr/>
+          </a:p>
+          <a:p>
+            <a:pPr indent="-381000" lvl="1" marL="914400" rtl="0" algn="l">
+              <a:spcBef>
+                <a:spcPts val="0"/>
+              </a:spcBef>
+              <a:spcAft>
+                <a:spcPts val="0"/>
+              </a:spcAft>
+              <a:buSzPts val="2400"/>
+              <a:buChar char="○"/>
+            </a:pPr>
+            <a:r>
+              <a:rPr lang="it-IT"/>
+              <a:t>Campionamento con </a:t>
+            </a:r>
+            <a:r>
+              <a:rPr lang="it-IT"/>
+              <a:t>Sliding Window</a:t>
+            </a:r>
+            <a:endParaRPr/>
+          </a:p>
+          <a:p>
+            <a:pPr indent="-381000" lvl="1" marL="914400" rtl="0" algn="l">
+              <a:spcBef>
+                <a:spcPts val="0"/>
+              </a:spcBef>
+              <a:spcAft>
+                <a:spcPts val="0"/>
+              </a:spcAft>
+              <a:buSzPts val="2400"/>
+              <a:buChar char="○"/>
+            </a:pPr>
+            <a:r>
+              <a:rPr lang="it-IT"/>
+              <a:t>Utilizzo di sensori inerziali</a:t>
+            </a:r>
+            <a:endParaRPr/>
+          </a:p>
+          <a:p>
+            <a:pPr indent="-381000" lvl="1" marL="914400" rtl="0" algn="l">
+              <a:spcBef>
+                <a:spcPts val="0"/>
+              </a:spcBef>
+              <a:spcAft>
+                <a:spcPts val="0"/>
+              </a:spcAft>
+              <a:buSzPts val="2400"/>
+              <a:buChar char="○"/>
+            </a:pPr>
+            <a:r>
+              <a:rPr lang="it-IT"/>
+              <a:t>Filtro di Kalman</a:t>
+            </a:r>
+            <a:endParaRPr/>
+          </a:p>
+          <a:p>
             <a:pPr indent="0" lvl="0" marL="0" rtl="0" algn="l">
               <a:spcBef>
                 <a:spcPts val="360"/>
@@ -11560,6 +13103,23 @@
             </a:pPr>
             <a:r>
               <a:t/>
+            </a:r>
+            <a:endParaRPr/>
+          </a:p>
+          <a:p>
+            <a:pPr indent="-381000" lvl="0" marL="457200" rtl="0" algn="l">
+              <a:spcBef>
+                <a:spcPts val="360"/>
+              </a:spcBef>
+              <a:spcAft>
+                <a:spcPts val="0"/>
+              </a:spcAft>
+              <a:buSzPts val="2400"/>
+              <a:buChar char="●"/>
+            </a:pPr>
+            <a:r>
+              <a:rPr lang="it-IT"/>
+              <a:t>L’uso di un filtro di Kalman, insieme ai dati dell’accelerometro, permette di migliorare la stabilità del modello.</a:t>
             </a:r>
             <a:endParaRPr/>
           </a:p>
@@ -11567,7 +13127,7 @@
       </p:sp>
       <p:sp>
         <p:nvSpPr>
-          <p:cNvPr id="129" name="Google Shape;129;g866f9fc50c_0_220"/>
+          <p:cNvPr id="138" name="Google Shape;138;g8c6def6be4_0_39"/>
           <p:cNvSpPr txBox="1"/>
           <p:nvPr>
             <p:ph type="title"/>
@@ -11599,7 +13159,7 @@
             </a:pPr>
             <a:r>
               <a:rPr lang="it-IT"/>
-              <a:t>Conclusioni</a:t>
+              <a:t>Stabilizzazione</a:t>
             </a:r>
             <a:endParaRPr/>
           </a:p>
@@ -11618,7 +13178,7 @@
   <p:cSld>
     <p:spTree>
       <p:nvGrpSpPr>
-        <p:cNvPr id="133" name="Shape 133"/>
+        <p:cNvPr id="142" name="Shape 142"/>
         <p:cNvGrpSpPr/>
         <p:nvPr/>
       </p:nvGrpSpPr>
@@ -11632,7 +13192,7 @@
       </p:grpSpPr>
       <p:sp>
         <p:nvSpPr>
-          <p:cNvPr id="134" name="Google Shape;134;g866f9fc50c_0_225"/>
+          <p:cNvPr id="143" name="Google Shape;143;g866f9fc50c_0_180"/>
           <p:cNvSpPr txBox="1"/>
           <p:nvPr>
             <p:ph idx="1" type="body"/>
@@ -11641,7 +13201,7 @@
         <p:spPr>
           <a:xfrm>
             <a:off x="457200" y="1600200"/>
-            <a:ext cx="8229600" cy="4526100"/>
+            <a:ext cx="8229600" cy="551700"/>
           </a:xfrm>
           <a:prstGeom prst="rect">
             <a:avLst/>
@@ -11663,15 +13223,24 @@
               <a:buNone/>
             </a:pPr>
             <a:r>
-              <a:t/>
+              <a:rPr b="1" lang="it-IT">
+                <a:solidFill>
+                  <a:srgbClr val="434343"/>
+                </a:solidFill>
+              </a:rPr>
+              <a:t>Interfaccia grafica dell’applicazione Mobile Sviluppata</a:t>
             </a:r>
-            <a:endParaRPr/>
+            <a:endParaRPr b="1">
+              <a:solidFill>
+                <a:srgbClr val="434343"/>
+              </a:solidFill>
+            </a:endParaRPr>
           </a:p>
         </p:txBody>
       </p:sp>
       <p:sp>
         <p:nvSpPr>
-          <p:cNvPr id="135" name="Google Shape;135;g866f9fc50c_0_225"/>
+          <p:cNvPr id="144" name="Google Shape;144;g866f9fc50c_0_180"/>
           <p:cNvSpPr txBox="1"/>
           <p:nvPr>
             <p:ph type="title"/>
@@ -11703,12 +13272,96 @@
             </a:pPr>
             <a:r>
               <a:rPr lang="it-IT"/>
-              <a:t>Ringraziamenti</a:t>
+              <a:t>Applicazione Mobile</a:t>
             </a:r>
             <a:endParaRPr/>
           </a:p>
         </p:txBody>
       </p:sp>
+      <p:pic>
+        <p:nvPicPr>
+          <p:cNvPr id="145" name="Google Shape;145;g866f9fc50c_0_180"/>
+          <p:cNvPicPr preferRelativeResize="0"/>
+          <p:nvPr/>
+        </p:nvPicPr>
+        <p:blipFill>
+          <a:blip r:embed="rId3">
+            <a:alphaModFix/>
+          </a:blip>
+          <a:stretch>
+            <a:fillRect/>
+          </a:stretch>
+        </p:blipFill>
+        <p:spPr>
+          <a:xfrm>
+            <a:off x="1381825" y="2151900"/>
+            <a:ext cx="1943663" cy="4036699"/>
+          </a:xfrm>
+          <a:prstGeom prst="rect">
+            <a:avLst/>
+          </a:prstGeom>
+          <a:noFill/>
+          <a:ln>
+            <a:noFill/>
+          </a:ln>
+        </p:spPr>
+      </p:pic>
+      <p:pic>
+        <p:nvPicPr>
+          <p:cNvPr id="146" name="Google Shape;146;g866f9fc50c_0_180"/>
+          <p:cNvPicPr preferRelativeResize="0"/>
+          <p:nvPr/>
+        </p:nvPicPr>
+        <p:blipFill>
+          <a:blip r:embed="rId4">
+            <a:alphaModFix/>
+          </a:blip>
+          <a:stretch>
+            <a:fillRect/>
+          </a:stretch>
+        </p:blipFill>
+        <p:spPr>
+          <a:xfrm>
+            <a:off x="3465262" y="2151900"/>
+            <a:ext cx="1940201" cy="4036702"/>
+          </a:xfrm>
+          <a:prstGeom prst="rect">
+            <a:avLst/>
+          </a:prstGeom>
+          <a:noFill/>
+          <a:ln>
+            <a:noFill/>
+          </a:ln>
+        </p:spPr>
+      </p:pic>
+      <p:pic>
+        <p:nvPicPr>
+          <p:cNvPr id="147" name="Google Shape;147;g866f9fc50c_0_180"/>
+          <p:cNvPicPr preferRelativeResize="0"/>
+          <p:nvPr/>
+        </p:nvPicPr>
+        <p:blipFill>
+          <a:blip r:embed="rId5">
+            <a:alphaModFix/>
+          </a:blip>
+          <a:stretch>
+            <a:fillRect/>
+          </a:stretch>
+        </p:blipFill>
+        <p:spPr>
+          <a:xfrm>
+            <a:off x="5545239" y="2151900"/>
+            <a:ext cx="1943662" cy="4036699"/>
+          </a:xfrm>
+          <a:prstGeom prst="rect">
+            <a:avLst/>
+          </a:prstGeom>
+          <a:noFill/>
+          <a:ln>
+            <a:noFill/>
+          </a:ln>
+        </p:spPr>
+      </p:pic>
     </p:spTree>
   </p:cSld>
   <p:clrMapOvr>
@@ -11718,6 +13371,285 @@
 </file>
 
 <file path=ppt/theme/theme1.xml><?xml version="1.0" encoding="utf-8"?>
+<a:theme xmlns:a="http://schemas.openxmlformats.org/drawingml/2006/main" xmlns:r="http://schemas.openxmlformats.org/officeDocument/2006/relationships">
+  <a:themeElements>
+    <a:clrScheme name="Default">
+      <a:dk1>
+        <a:srgbClr val="000000"/>
+      </a:dk1>
+      <a:lt1>
+        <a:srgbClr val="FFFFFF"/>
+      </a:lt1>
+      <a:dk2>
+        <a:srgbClr val="158158"/>
+      </a:dk2>
+      <a:lt2>
+        <a:srgbClr val="F3F3F3"/>
+      </a:lt2>
+      <a:accent1>
+        <a:srgbClr val="058DC7"/>
+      </a:accent1>
+      <a:accent2>
+        <a:srgbClr val="50B432"/>
+      </a:accent2>
+      <a:accent3>
+        <a:srgbClr val="ED561B"/>
+      </a:accent3>
+      <a:accent4>
+        <a:srgbClr val="EDEF00"/>
+      </a:accent4>
+      <a:accent5>
+        <a:srgbClr val="24CBE5"/>
+      </a:accent5>
+      <a:accent6>
+        <a:srgbClr val="64E572"/>
+      </a:accent6>
+      <a:hlink>
+        <a:srgbClr val="2200CC"/>
+      </a:hlink>
+      <a:folHlink>
+        <a:srgbClr val="551A8B"/>
+      </a:folHlink>
+    </a:clrScheme>
+    <a:fontScheme name="Office">
+      <a:majorFont>
+        <a:latin typeface="Arial"/>
+        <a:ea typeface=""/>
+        <a:cs typeface=""/>
+        <a:font script="Jpan" typeface="ＭＳ Ｐゴシック"/>
+        <a:font script="Hang" typeface="맑은 고딕"/>
+        <a:font script="Hans" typeface="宋体"/>
+        <a:font script="Hant" typeface="新細明體"/>
+        <a:font script="Arab" typeface="Times New Roman"/>
+        <a:font script="Hebr" typeface="Times New Roman"/>
+        <a:font script="Thai" typeface="Angsana New"/>
+        <a:font script="Ethi" typeface="Nyala"/>
+        <a:font script="Beng" typeface="Vrinda"/>
+        <a:font script="Gujr" typeface="Shruti"/>
+        <a:font script="Khmr" typeface="MoolBoran"/>
+        <a:font script="Knda" typeface="Tunga"/>
+        <a:font script="Guru" typeface="Raavi"/>
+        <a:font script="Cans" typeface="Euphemia"/>
+        <a:font script="Cher" typeface="Plantagenet Cherokee"/>
+        <a:font script="Yiii" typeface="Microsoft Yi Baiti"/>
+        <a:font script="Tibt" typeface="Microsoft Himalaya"/>
+        <a:font script="Thaa" typeface="MV Boli"/>
+        <a:font script="Deva" typeface="Mangal"/>
+        <a:font script="Telu" typeface="Gautami"/>
+        <a:font script="Taml" typeface="Latha"/>
+        <a:font script="Syrc" typeface="Estrangelo Edessa"/>
+        <a:font script="Orya" typeface="Kalinga"/>
+        <a:font script="Mlym" typeface="Kartika"/>
+        <a:font script="Laoo" typeface="DokChampa"/>
+        <a:font script="Sinh" typeface="Iskoola Pota"/>
+        <a:font script="Mong" typeface="Mongolian Baiti"/>
+        <a:font script="Viet" typeface="Times New Roman"/>
+        <a:font script="Uigh" typeface="Microsoft Uighur"/>
+        <a:font script="Geor" typeface="Sylfaen"/>
+      </a:majorFont>
+      <a:minorFont>
+        <a:latin typeface="Arial"/>
+        <a:ea typeface=""/>
+        <a:cs typeface=""/>
+        <a:font script="Jpan" typeface="ＭＳ Ｐゴシック"/>
+        <a:font script="Hang" typeface="맑은 고딕"/>
+        <a:font script="Hans" typeface="宋体"/>
+        <a:font script="Hant" typeface="新細明體"/>
+        <a:font script="Arab" typeface="Arial"/>
+        <a:font script="Hebr" typeface="Arial"/>
+        <a:font script="Thai" typeface="Cordia New"/>
+        <a:font script="Ethi" typeface="Nyala"/>
+        <a:font script="Beng" typeface="Vrinda"/>
+        <a:font script="Gujr" typeface="Shruti"/>
+        <a:font script="Khmr" typeface="DaunPenh"/>
+        <a:font script="Knda" typeface="Tunga"/>
+        <a:font script="Guru" typeface="Raavi"/>
+        <a:font script="Cans" typeface="Euphemia"/>
+        <a:font script="Cher" typeface="Plantagenet Cherokee"/>
+        <a:font script="Yiii" typeface="Microsoft Yi Baiti"/>
+        <a:font script="Tibt" typeface="Microsoft Himalaya"/>
+        <a:font script="Thaa" typeface="MV Boli"/>
+        <a:font script="Deva" typeface="Mangal"/>
+        <a:font script="Telu" typeface="Gautami"/>
+        <a:font script="Taml" typeface="Latha"/>
+        <a:font script="Syrc" typeface="Estrangelo Edessa"/>
+        <a:font script="Orya" typeface="Kalinga"/>
+        <a:font script="Mlym" typeface="Kartika"/>
+        <a:font script="Laoo" typeface="DokChampa"/>
+        <a:font script="Sinh" typeface="Iskoola Pota"/>
+        <a:font script="Mong" typeface="Mongolian Baiti"/>
+        <a:font script="Viet" typeface="Arial"/>
+        <a:font script="Uigh" typeface="Microsoft Uighur"/>
+        <a:font script="Geor" typeface="Sylfaen"/>
+      </a:minorFont>
+    </a:fontScheme>
+    <a:fmtScheme name="Office">
+      <a:fillStyleLst>
+        <a:solidFill>
+          <a:schemeClr val="phClr"/>
+        </a:solidFill>
+        <a:gradFill rotWithShape="1">
+          <a:gsLst>
+            <a:gs pos="0">
+              <a:schemeClr val="phClr">
+                <a:tint val="50000"/>
+                <a:satMod val="300000"/>
+              </a:schemeClr>
+            </a:gs>
+            <a:gs pos="35000">
+              <a:schemeClr val="phClr">
+                <a:tint val="37000"/>
+                <a:satMod val="300000"/>
+              </a:schemeClr>
+            </a:gs>
+            <a:gs pos="100000">
+              <a:schemeClr val="phClr">
+                <a:tint val="15000"/>
+                <a:satMod val="350000"/>
+              </a:schemeClr>
+            </a:gs>
+          </a:gsLst>
+          <a:lin ang="16200000" scaled="1"/>
+        </a:gradFill>
+        <a:gradFill rotWithShape="1">
+          <a:gsLst>
+            <a:gs pos="0">
+              <a:schemeClr val="phClr">
+                <a:tint val="100000"/>
+                <a:shade val="100000"/>
+                <a:satMod val="130000"/>
+              </a:schemeClr>
+            </a:gs>
+            <a:gs pos="100000">
+              <a:schemeClr val="phClr">
+                <a:tint val="50000"/>
+                <a:shade val="100000"/>
+                <a:satMod val="350000"/>
+              </a:schemeClr>
+            </a:gs>
+          </a:gsLst>
+          <a:lin ang="16200000" scaled="0"/>
+        </a:gradFill>
+      </a:fillStyleLst>
+      <a:lnStyleLst>
+        <a:ln w="9525" cap="flat" cmpd="sng" algn="ctr">
+          <a:solidFill>
+            <a:schemeClr val="phClr">
+              <a:shade val="95000"/>
+              <a:satMod val="105000"/>
+            </a:schemeClr>
+          </a:solidFill>
+          <a:prstDash val="solid"/>
+        </a:ln>
+        <a:ln w="25400" cap="flat" cmpd="sng" algn="ctr">
+          <a:solidFill>
+            <a:schemeClr val="phClr"/>
+          </a:solidFill>
+          <a:prstDash val="solid"/>
+        </a:ln>
+        <a:ln w="38100" cap="flat" cmpd="sng" algn="ctr">
+          <a:solidFill>
+            <a:schemeClr val="phClr"/>
+          </a:solidFill>
+          <a:prstDash val="solid"/>
+        </a:ln>
+      </a:lnStyleLst>
+      <a:effectStyleLst>
+        <a:effectStyle>
+          <a:effectLst>
+            <a:outerShdw blurRad="40000" dist="20000" dir="5400000" rotWithShape="0">
+              <a:srgbClr val="000000">
+                <a:alpha val="38000"/>
+              </a:srgbClr>
+            </a:outerShdw>
+          </a:effectLst>
+        </a:effectStyle>
+        <a:effectStyle>
+          <a:effectLst>
+            <a:outerShdw blurRad="40000" dist="23000" dir="5400000" rotWithShape="0">
+              <a:srgbClr val="000000">
+                <a:alpha val="35000"/>
+              </a:srgbClr>
+            </a:outerShdw>
+          </a:effectLst>
+        </a:effectStyle>
+        <a:effectStyle>
+          <a:effectLst>
+            <a:outerShdw blurRad="40000" dist="23000" dir="5400000" rotWithShape="0">
+              <a:srgbClr val="000000">
+                <a:alpha val="35000"/>
+              </a:srgbClr>
+            </a:outerShdw>
+          </a:effectLst>
+          <a:scene3d>
+            <a:camera prst="orthographicFront">
+              <a:rot lat="0" lon="0" rev="0"/>
+            </a:camera>
+            <a:lightRig rig="threePt" dir="t">
+              <a:rot lat="0" lon="0" rev="1200000"/>
+            </a:lightRig>
+          </a:scene3d>
+          <a:sp3d>
+            <a:bevelT w="63500" h="25400"/>
+          </a:sp3d>
+        </a:effectStyle>
+      </a:effectStyleLst>
+      <a:bgFillStyleLst>
+        <a:solidFill>
+          <a:schemeClr val="phClr"/>
+        </a:solidFill>
+        <a:gradFill rotWithShape="1">
+          <a:gsLst>
+            <a:gs pos="0">
+              <a:schemeClr val="phClr">
+                <a:tint val="40000"/>
+                <a:satMod val="350000"/>
+              </a:schemeClr>
+            </a:gs>
+            <a:gs pos="40000">
+              <a:schemeClr val="phClr">
+                <a:tint val="45000"/>
+                <a:shade val="99000"/>
+                <a:satMod val="350000"/>
+              </a:schemeClr>
+            </a:gs>
+            <a:gs pos="100000">
+              <a:schemeClr val="phClr">
+                <a:shade val="20000"/>
+                <a:satMod val="255000"/>
+              </a:schemeClr>
+            </a:gs>
+          </a:gsLst>
+          <a:path path="circle">
+            <a:fillToRect l="50000" t="-80000" r="50000" b="180000"/>
+          </a:path>
+        </a:gradFill>
+        <a:gradFill rotWithShape="1">
+          <a:gsLst>
+            <a:gs pos="0">
+              <a:schemeClr val="phClr">
+                <a:tint val="80000"/>
+                <a:satMod val="300000"/>
+              </a:schemeClr>
+            </a:gs>
+            <a:gs pos="100000">
+              <a:schemeClr val="phClr">
+                <a:shade val="30000"/>
+                <a:satMod val="200000"/>
+              </a:schemeClr>
+            </a:gs>
+          </a:gsLst>
+          <a:path path="circle">
+            <a:fillToRect l="50000" t="50000" r="50000" b="50000"/>
+          </a:path>
+        </a:gradFill>
+      </a:bgFillStyleLst>
+    </a:fmtScheme>
+  </a:themeElements>
+</a:theme>
+</file>
+
+<file path=ppt/theme/theme2.xml><?xml version="1.0" encoding="utf-8"?>
 <a:theme xmlns:a="http://schemas.openxmlformats.org/drawingml/2006/main" xmlns:r="http://schemas.openxmlformats.org/officeDocument/2006/relationships" name="Tema di Office">
   <a:themeElements>
     <a:clrScheme name="Office">
@@ -11994,283 +13926,4 @@
     </a:fmtScheme>
   </a:themeElements>
 </a:theme>
-</file>
-
-<file path=ppt/theme/theme2.xml><?xml version="1.0" encoding="utf-8"?>
-<a:theme xmlns:a="http://schemas.openxmlformats.org/drawingml/2006/main" xmlns:r="http://schemas.openxmlformats.org/officeDocument/2006/relationships">
-  <a:themeElements>
-    <a:clrScheme name="Default">
-      <a:dk1>
-        <a:srgbClr val="000000"/>
-      </a:dk1>
-      <a:lt1>
-        <a:srgbClr val="FFFFFF"/>
-      </a:lt1>
-      <a:dk2>
-        <a:srgbClr val="158158"/>
-      </a:dk2>
-      <a:lt2>
-        <a:srgbClr val="F3F3F3"/>
-      </a:lt2>
-      <a:accent1>
-        <a:srgbClr val="058DC7"/>
-      </a:accent1>
-      <a:accent2>
-        <a:srgbClr val="50B432"/>
-      </a:accent2>
-      <a:accent3>
-        <a:srgbClr val="ED561B"/>
-      </a:accent3>
-      <a:accent4>
-        <a:srgbClr val="EDEF00"/>
-      </a:accent4>
-      <a:accent5>
-        <a:srgbClr val="24CBE5"/>
-      </a:accent5>
-      <a:accent6>
-        <a:srgbClr val="64E572"/>
-      </a:accent6>
-      <a:hlink>
-        <a:srgbClr val="2200CC"/>
-      </a:hlink>
-      <a:folHlink>
-        <a:srgbClr val="551A8B"/>
-      </a:folHlink>
-    </a:clrScheme>
-    <a:fontScheme name="Office">
-      <a:majorFont>
-        <a:latin typeface="Arial"/>
-        <a:ea typeface=""/>
-        <a:cs typeface=""/>
-        <a:font script="Jpan" typeface="ＭＳ Ｐゴシック"/>
-        <a:font script="Hang" typeface="맑은 고딕"/>
-        <a:font script="Hans" typeface="宋体"/>
-        <a:font script="Hant" typeface="新細明體"/>
-        <a:font script="Arab" typeface="Times New Roman"/>
-        <a:font script="Hebr" typeface="Times New Roman"/>
-        <a:font script="Thai" typeface="Angsana New"/>
-        <a:font script="Ethi" typeface="Nyala"/>
-        <a:font script="Beng" typeface="Vrinda"/>
-        <a:font script="Gujr" typeface="Shruti"/>
-        <a:font script="Khmr" typeface="MoolBoran"/>
-        <a:font script="Knda" typeface="Tunga"/>
-        <a:font script="Guru" typeface="Raavi"/>
-        <a:font script="Cans" typeface="Euphemia"/>
-        <a:font script="Cher" typeface="Plantagenet Cherokee"/>
-        <a:font script="Yiii" typeface="Microsoft Yi Baiti"/>
-        <a:font script="Tibt" typeface="Microsoft Himalaya"/>
-        <a:font script="Thaa" typeface="MV Boli"/>
-        <a:font script="Deva" typeface="Mangal"/>
-        <a:font script="Telu" typeface="Gautami"/>
-        <a:font script="Taml" typeface="Latha"/>
-        <a:font script="Syrc" typeface="Estrangelo Edessa"/>
-        <a:font script="Orya" typeface="Kalinga"/>
-        <a:font script="Mlym" typeface="Kartika"/>
-        <a:font script="Laoo" typeface="DokChampa"/>
-        <a:font script="Sinh" typeface="Iskoola Pota"/>
-        <a:font script="Mong" typeface="Mongolian Baiti"/>
-        <a:font script="Viet" typeface="Times New Roman"/>
-        <a:font script="Uigh" typeface="Microsoft Uighur"/>
-        <a:font script="Geor" typeface="Sylfaen"/>
-      </a:majorFont>
-      <a:minorFont>
-        <a:latin typeface="Arial"/>
-        <a:ea typeface=""/>
-        <a:cs typeface=""/>
-        <a:font script="Jpan" typeface="ＭＳ Ｐゴシック"/>
-        <a:font script="Hang" typeface="맑은 고딕"/>
-        <a:font script="Hans" typeface="宋体"/>
-        <a:font script="Hant" typeface="新細明體"/>
-        <a:font script="Arab" typeface="Arial"/>
-        <a:font script="Hebr" typeface="Arial"/>
-        <a:font script="Thai" typeface="Cordia New"/>
-        <a:font script="Ethi" typeface="Nyala"/>
-        <a:font script="Beng" typeface="Vrinda"/>
-        <a:font script="Gujr" typeface="Shruti"/>
-        <a:font script="Khmr" typeface="DaunPenh"/>
-        <a:font script="Knda" typeface="Tunga"/>
-        <a:font script="Guru" typeface="Raavi"/>
-        <a:font script="Cans" typeface="Euphemia"/>
-        <a:font script="Cher" typeface="Plantagenet Cherokee"/>
-        <a:font script="Yiii" typeface="Microsoft Yi Baiti"/>
-        <a:font script="Tibt" typeface="Microsoft Himalaya"/>
-        <a:font script="Thaa" typeface="MV Boli"/>
-        <a:font script="Deva" typeface="Mangal"/>
-        <a:font script="Telu" typeface="Gautami"/>
-        <a:font script="Taml" typeface="Latha"/>
-        <a:font script="Syrc" typeface="Estrangelo Edessa"/>
-        <a:font script="Orya" typeface="Kalinga"/>
-        <a:font script="Mlym" typeface="Kartika"/>
-        <a:font script="Laoo" typeface="DokChampa"/>
-        <a:font script="Sinh" typeface="Iskoola Pota"/>
-        <a:font script="Mong" typeface="Mongolian Baiti"/>
-        <a:font script="Viet" typeface="Arial"/>
-        <a:font script="Uigh" typeface="Microsoft Uighur"/>
-        <a:font script="Geor" typeface="Sylfaen"/>
-      </a:minorFont>
-    </a:fontScheme>
-    <a:fmtScheme name="Office">
-      <a:fillStyleLst>
-        <a:solidFill>
-          <a:schemeClr val="phClr"/>
-        </a:solidFill>
-        <a:gradFill rotWithShape="1">
-          <a:gsLst>
-            <a:gs pos="0">
-              <a:schemeClr val="phClr">
-                <a:tint val="50000"/>
-                <a:satMod val="300000"/>
-              </a:schemeClr>
-            </a:gs>
-            <a:gs pos="35000">
-              <a:schemeClr val="phClr">
-                <a:tint val="37000"/>
-                <a:satMod val="300000"/>
-              </a:schemeClr>
-            </a:gs>
-            <a:gs pos="100000">
-              <a:schemeClr val="phClr">
-                <a:tint val="15000"/>
-                <a:satMod val="350000"/>
-              </a:schemeClr>
-            </a:gs>
-          </a:gsLst>
-          <a:lin ang="16200000" scaled="1"/>
-        </a:gradFill>
-        <a:gradFill rotWithShape="1">
-          <a:gsLst>
-            <a:gs pos="0">
-              <a:schemeClr val="phClr">
-                <a:tint val="100000"/>
-                <a:shade val="100000"/>
-                <a:satMod val="130000"/>
-              </a:schemeClr>
-            </a:gs>
-            <a:gs pos="100000">
-              <a:schemeClr val="phClr">
-                <a:tint val="50000"/>
-                <a:shade val="100000"/>
-                <a:satMod val="350000"/>
-              </a:schemeClr>
-            </a:gs>
-          </a:gsLst>
-          <a:lin ang="16200000" scaled="0"/>
-        </a:gradFill>
-      </a:fillStyleLst>
-      <a:lnStyleLst>
-        <a:ln w="9525" cap="flat" cmpd="sng" algn="ctr">
-          <a:solidFill>
-            <a:schemeClr val="phClr">
-              <a:shade val="95000"/>
-              <a:satMod val="105000"/>
-            </a:schemeClr>
-          </a:solidFill>
-          <a:prstDash val="solid"/>
-        </a:ln>
-        <a:ln w="25400" cap="flat" cmpd="sng" algn="ctr">
-          <a:solidFill>
-            <a:schemeClr val="phClr"/>
-          </a:solidFill>
-          <a:prstDash val="solid"/>
-        </a:ln>
-        <a:ln w="38100" cap="flat" cmpd="sng" algn="ctr">
-          <a:solidFill>
-            <a:schemeClr val="phClr"/>
-          </a:solidFill>
-          <a:prstDash val="solid"/>
-        </a:ln>
-      </a:lnStyleLst>
-      <a:effectStyleLst>
-        <a:effectStyle>
-          <a:effectLst>
-            <a:outerShdw blurRad="40000" dist="20000" dir="5400000" rotWithShape="0">
-              <a:srgbClr val="000000">
-                <a:alpha val="38000"/>
-              </a:srgbClr>
-            </a:outerShdw>
-          </a:effectLst>
-        </a:effectStyle>
-        <a:effectStyle>
-          <a:effectLst>
-            <a:outerShdw blurRad="40000" dist="23000" dir="5400000" rotWithShape="0">
-              <a:srgbClr val="000000">
-                <a:alpha val="35000"/>
-              </a:srgbClr>
-            </a:outerShdw>
-          </a:effectLst>
-        </a:effectStyle>
-        <a:effectStyle>
-          <a:effectLst>
-            <a:outerShdw blurRad="40000" dist="23000" dir="5400000" rotWithShape="0">
-              <a:srgbClr val="000000">
-                <a:alpha val="35000"/>
-              </a:srgbClr>
-            </a:outerShdw>
-          </a:effectLst>
-          <a:scene3d>
-            <a:camera prst="orthographicFront">
-              <a:rot lat="0" lon="0" rev="0"/>
-            </a:camera>
-            <a:lightRig rig="threePt" dir="t">
-              <a:rot lat="0" lon="0" rev="1200000"/>
-            </a:lightRig>
-          </a:scene3d>
-          <a:sp3d>
-            <a:bevelT w="63500" h="25400"/>
-          </a:sp3d>
-        </a:effectStyle>
-      </a:effectStyleLst>
-      <a:bgFillStyleLst>
-        <a:solidFill>
-          <a:schemeClr val="phClr"/>
-        </a:solidFill>
-        <a:gradFill rotWithShape="1">
-          <a:gsLst>
-            <a:gs pos="0">
-              <a:schemeClr val="phClr">
-                <a:tint val="40000"/>
-                <a:satMod val="350000"/>
-              </a:schemeClr>
-            </a:gs>
-            <a:gs pos="40000">
-              <a:schemeClr val="phClr">
-                <a:tint val="45000"/>
-                <a:shade val="99000"/>
-                <a:satMod val="350000"/>
-              </a:schemeClr>
-            </a:gs>
-            <a:gs pos="100000">
-              <a:schemeClr val="phClr">
-                <a:shade val="20000"/>
-                <a:satMod val="255000"/>
-              </a:schemeClr>
-            </a:gs>
-          </a:gsLst>
-          <a:path path="circle">
-            <a:fillToRect l="50000" t="-80000" r="50000" b="180000"/>
-          </a:path>
-        </a:gradFill>
-        <a:gradFill rotWithShape="1">
-          <a:gsLst>
-            <a:gs pos="0">
-              <a:schemeClr val="phClr">
-                <a:tint val="80000"/>
-                <a:satMod val="300000"/>
-              </a:schemeClr>
-            </a:gs>
-            <a:gs pos="100000">
-              <a:schemeClr val="phClr">
-                <a:shade val="30000"/>
-                <a:satMod val="200000"/>
-              </a:schemeClr>
-            </a:gs>
-          </a:gsLst>
-          <a:path path="circle">
-            <a:fillToRect l="50000" t="50000" r="50000" b="50000"/>
-          </a:path>
-        </a:gradFill>
-      </a:bgFillStyleLst>
-    </a:fmtScheme>
-  </a:themeElements>
-</a:theme>
 </file>
</xml_diff>